<commit_message>
small tweaks to the ppt
</commit_message>
<xml_diff>
--- a/doc/final_presentation/group2_final_presentation.pptx
+++ b/doc/final_presentation/group2_final_presentation.pptx
@@ -14102,6 +14102,13 @@
   <p:clrMapOvr>
     <a:masterClrMapping/>
   </p:clrMapOvr>
+  <p:timing>
+    <p:tnLst>
+      <p:par>
+        <p:cTn id="1" dur="indefinite" restart="never" nodeType="tmRoot"/>
+      </p:par>
+    </p:tnLst>
+  </p:timing>
 </p:sld>
 </file>
 
@@ -14180,7 +14187,7 @@
                 <a16:creationId xmlns:a16="http://schemas.microsoft.com/office/drawing/2014/main" id="{0A6CF53F-A77A-BC5A-BC49-AF84A8D08E0A}"/>
               </a:ext>
               <a:ext uri="{C183D7F6-B498-43B3-948B-1728B52AA6E4}">
-                <adec:decorative xmlns="" xmlns:adec="http://schemas.microsoft.com/office/drawing/2017/decorative" val="1"/>
+                <adec:decorative xmlns:adec="http://schemas.microsoft.com/office/drawing/2017/decorative" xmlns="" val="1"/>
               </a:ext>
             </a:extLst>
           </p:cNvPr>
@@ -14355,7 +14362,7 @@
                 <a16:creationId xmlns:a16="http://schemas.microsoft.com/office/drawing/2014/main" id="{92023AC7-42E6-EAE3-475C-2143D5E94AAD}"/>
               </a:ext>
               <a:ext uri="{C183D7F6-B498-43B3-948B-1728B52AA6E4}">
-                <adec:decorative xmlns="" xmlns:adec="http://schemas.microsoft.com/office/drawing/2017/decorative" val="1"/>
+                <adec:decorative xmlns:adec="http://schemas.microsoft.com/office/drawing/2017/decorative" xmlns="" val="1"/>
               </a:ext>
             </a:extLst>
           </p:cNvPr>
@@ -14418,7 +14425,7 @@
                 <a16:creationId xmlns:a16="http://schemas.microsoft.com/office/drawing/2014/main" id="{D7726E50-EA96-2EED-330C-CC64F838CDDD}"/>
               </a:ext>
               <a:ext uri="{C183D7F6-B498-43B3-948B-1728B52AA6E4}">
-                <adec:decorative xmlns="" xmlns:adec="http://schemas.microsoft.com/office/drawing/2017/decorative" val="1"/>
+                <adec:decorative xmlns:adec="http://schemas.microsoft.com/office/drawing/2017/decorative" xmlns="" val="1"/>
               </a:ext>
             </a:extLst>
           </p:cNvPr>
@@ -14924,11 +14931,11 @@
   <p:clrMapOvr>
     <a:masterClrMapping/>
   </p:clrMapOvr>
-  <mc:AlternateContent xmlns:mc="http://schemas.openxmlformats.org/markup-compatibility/2006">
-    <mc:Choice xmlns:p14="http://schemas.microsoft.com/office/powerpoint/2010/main" Requires="p14">
+  <mc:AlternateContent xmlns:mc="http://schemas.openxmlformats.org/markup-compatibility/2006" xmlns:p14="http://schemas.microsoft.com/office/powerpoint/2010/main">
+    <mc:Choice Requires="p14">
       <p:transition spd="slow" p14:dur="2000"/>
     </mc:Choice>
-    <mc:Fallback>
+    <mc:Fallback xmlns="">
       <p:transition spd="slow"/>
     </mc:Fallback>
   </mc:AlternateContent>
@@ -15010,7 +15017,7 @@
                 <a16:creationId xmlns:a16="http://schemas.microsoft.com/office/drawing/2014/main" id="{5E720A80-D45D-04A9-5008-657DA6B31B43}"/>
               </a:ext>
               <a:ext uri="{C183D7F6-B498-43B3-948B-1728B52AA6E4}">
-                <adec:decorative xmlns="" xmlns:adec="http://schemas.microsoft.com/office/drawing/2017/decorative" val="1"/>
+                <adec:decorative xmlns:adec="http://schemas.microsoft.com/office/drawing/2017/decorative" xmlns="" val="1"/>
               </a:ext>
             </a:extLst>
           </p:cNvPr>
@@ -15185,7 +15192,7 @@
                 <a16:creationId xmlns:a16="http://schemas.microsoft.com/office/drawing/2014/main" id="{13C78BF2-B10B-0854-AA59-8C858E8BB9B7}"/>
               </a:ext>
               <a:ext uri="{C183D7F6-B498-43B3-948B-1728B52AA6E4}">
-                <adec:decorative xmlns="" xmlns:adec="http://schemas.microsoft.com/office/drawing/2017/decorative" val="1"/>
+                <adec:decorative xmlns:adec="http://schemas.microsoft.com/office/drawing/2017/decorative" xmlns="" val="1"/>
               </a:ext>
             </a:extLst>
           </p:cNvPr>
@@ -15248,7 +15255,7 @@
                 <a16:creationId xmlns:a16="http://schemas.microsoft.com/office/drawing/2014/main" id="{0BADB147-AF64-59D3-6EC2-F084B030DB4D}"/>
               </a:ext>
               <a:ext uri="{C183D7F6-B498-43B3-948B-1728B52AA6E4}">
-                <adec:decorative xmlns="" xmlns:adec="http://schemas.microsoft.com/office/drawing/2017/decorative" val="1"/>
+                <adec:decorative xmlns:adec="http://schemas.microsoft.com/office/drawing/2017/decorative" xmlns="" val="1"/>
               </a:ext>
             </a:extLst>
           </p:cNvPr>
@@ -15753,14 +15760,21 @@
   <p:clrMapOvr>
     <a:masterClrMapping/>
   </p:clrMapOvr>
-  <mc:AlternateContent xmlns:mc="http://schemas.openxmlformats.org/markup-compatibility/2006">
-    <mc:Choice xmlns:p14="http://schemas.microsoft.com/office/powerpoint/2010/main" Requires="p14">
+  <mc:AlternateContent xmlns:mc="http://schemas.openxmlformats.org/markup-compatibility/2006" xmlns:p14="http://schemas.microsoft.com/office/powerpoint/2010/main">
+    <mc:Choice Requires="p14">
       <p:transition spd="slow" p14:dur="2000"/>
     </mc:Choice>
-    <mc:Fallback>
+    <mc:Fallback xmlns="">
       <p:transition spd="slow"/>
     </mc:Fallback>
   </mc:AlternateContent>
+  <p:timing>
+    <p:tnLst>
+      <p:par>
+        <p:cTn id="1" dur="indefinite" restart="never" nodeType="tmRoot"/>
+      </p:par>
+    </p:tnLst>
+  </p:timing>
 </p:sld>
 </file>
 
@@ -15861,7 +15875,6 @@
               <a:rPr lang="en-BE" dirty="0" smtClean="0"/>
               <a:t>BAN’s are very usefull to extract the totals</a:t>
             </a:r>
-            <a:endParaRPr lang="en-BE" dirty="0" smtClean="0"/>
           </a:p>
           <a:p>
             <a:pPr marL="0" indent="0">
@@ -15899,7 +15912,6 @@
               <a:rPr lang="en-BE" dirty="0" smtClean="0"/>
               <a:t>Users should know what time the data was ‘snapshotted’ to properly understand when a unit is in ‘future’ state</a:t>
             </a:r>
-            <a:endParaRPr lang="en-BE" dirty="0" smtClean="0"/>
           </a:p>
           <a:p>
             <a:endParaRPr lang="nl-BE" dirty="0"/>
@@ -15962,6 +15974,13 @@
   <p:clrMapOvr>
     <a:masterClrMapping/>
   </p:clrMapOvr>
+  <p:timing>
+    <p:tnLst>
+      <p:par>
+        <p:cTn id="1" dur="indefinite" restart="never" nodeType="tmRoot"/>
+      </p:par>
+    </p:tnLst>
+  </p:timing>
 </p:sld>
 </file>
 
@@ -16015,6 +16034,13 @@
   <p:clrMapOvr>
     <a:masterClrMapping/>
   </p:clrMapOvr>
+  <p:timing>
+    <p:tnLst>
+      <p:par>
+        <p:cTn id="1" dur="indefinite" restart="never" nodeType="tmRoot"/>
+      </p:par>
+    </p:tnLst>
+  </p:timing>
 </p:sld>
 </file>
 
@@ -16529,6 +16555,13 @@
   <p:clrMapOvr>
     <a:masterClrMapping/>
   </p:clrMapOvr>
+  <p:timing>
+    <p:tnLst>
+      <p:par>
+        <p:cTn id="1" dur="indefinite" restart="never" nodeType="tmRoot"/>
+      </p:par>
+    </p:tnLst>
+  </p:timing>
 </p:sld>
 </file>
 
@@ -16673,24 +16706,30 @@
         </p:nvSpPr>
         <p:spPr>
           <a:xfrm>
-            <a:off x="9274002" y="3908611"/>
+            <a:off x="10176698" y="3908611"/>
             <a:ext cx="1165412" cy="636494"/>
           </a:xfrm>
           <a:prstGeom prst="leftArrow">
             <a:avLst/>
           </a:prstGeom>
+          <a:solidFill>
+            <a:schemeClr val="accent1">
+              <a:alpha val="50000"/>
+            </a:schemeClr>
+          </a:solidFill>
+          <a:ln>
+            <a:noFill/>
+          </a:ln>
         </p:spPr>
         <p:style>
-          <a:lnRef idx="2">
-            <a:schemeClr val="accent1">
-              <a:shade val="50000"/>
-            </a:schemeClr>
+          <a:lnRef idx="0">
+            <a:scrgbClr r="0" g="0" b="0"/>
           </a:lnRef>
-          <a:fillRef idx="1">
-            <a:schemeClr val="accent1"/>
+          <a:fillRef idx="0">
+            <a:scrgbClr r="0" g="0" b="0"/>
           </a:fillRef>
           <a:effectRef idx="0">
-            <a:schemeClr val="accent1"/>
+            <a:scrgbClr r="0" g="0" b="0"/>
           </a:effectRef>
           <a:fontRef idx="minor">
             <a:schemeClr val="lt1"/>
@@ -16702,8 +16741,8 @@
           <a:p>
             <a:pPr algn="ctr"/>
             <a:r>
-              <a:rPr lang="en-BE" dirty="0"/>
-              <a:t>demo</a:t>
+              <a:rPr lang="en-BE" dirty="0" smtClean="0"/>
+              <a:t>video</a:t>
             </a:r>
             <a:endParaRPr lang="nl-BE" dirty="0"/>
           </a:p>
@@ -16779,6 +16818,100 @@
           </a:extLst>
         </p:spPr>
       </p:pic>
+      <p:sp>
+        <p:nvSpPr>
+          <p:cNvPr id="7" name="Left Arrow 6"/>
+          <p:cNvSpPr/>
+          <p:nvPr/>
+        </p:nvSpPr>
+        <p:spPr>
+          <a:xfrm>
+            <a:off x="8936723" y="3908611"/>
+            <a:ext cx="1165412" cy="636494"/>
+          </a:xfrm>
+          <a:prstGeom prst="leftArrow">
+            <a:avLst/>
+          </a:prstGeom>
+        </p:spPr>
+        <p:style>
+          <a:lnRef idx="2">
+            <a:schemeClr val="accent1">
+              <a:shade val="50000"/>
+            </a:schemeClr>
+          </a:lnRef>
+          <a:fillRef idx="1">
+            <a:schemeClr val="accent1"/>
+          </a:fillRef>
+          <a:effectRef idx="0">
+            <a:schemeClr val="accent1"/>
+          </a:effectRef>
+          <a:fontRef idx="minor">
+            <a:schemeClr val="lt1"/>
+          </a:fontRef>
+        </p:style>
+        <p:txBody>
+          <a:bodyPr rtlCol="0" anchor="ctr"/>
+          <a:lstStyle/>
+          <a:p>
+            <a:pPr algn="ctr"/>
+            <a:r>
+              <a:rPr lang="en-BE" dirty="0"/>
+              <a:t>demo</a:t>
+            </a:r>
+            <a:endParaRPr lang="nl-BE" dirty="0"/>
+          </a:p>
+        </p:txBody>
+      </p:sp>
+      <p:sp>
+        <p:nvSpPr>
+          <p:cNvPr id="8" name="Left Arrow 7"/>
+          <p:cNvSpPr/>
+          <p:nvPr/>
+        </p:nvSpPr>
+        <p:spPr>
+          <a:xfrm>
+            <a:off x="8936723" y="2847935"/>
+            <a:ext cx="1165412" cy="636494"/>
+          </a:xfrm>
+          <a:prstGeom prst="leftArrow">
+            <a:avLst/>
+          </a:prstGeom>
+          <a:solidFill>
+            <a:schemeClr val="accent1">
+              <a:alpha val="50000"/>
+            </a:schemeClr>
+          </a:solidFill>
+          <a:ln>
+            <a:noFill/>
+          </a:ln>
+        </p:spPr>
+        <p:style>
+          <a:lnRef idx="0">
+            <a:scrgbClr r="0" g="0" b="0"/>
+          </a:lnRef>
+          <a:fillRef idx="0">
+            <a:scrgbClr r="0" g="0" b="0"/>
+          </a:fillRef>
+          <a:effectRef idx="0">
+            <a:scrgbClr r="0" g="0" b="0"/>
+          </a:effectRef>
+          <a:fontRef idx="minor">
+            <a:schemeClr val="lt1"/>
+          </a:fontRef>
+        </p:style>
+        <p:txBody>
+          <a:bodyPr rtlCol="0" anchor="ctr"/>
+          <a:lstStyle/>
+          <a:p>
+            <a:pPr algn="ctr"/>
+            <a:r>
+              <a:rPr lang="en-BE" dirty="0" smtClean="0"/>
+              <a:t>video</a:t>
+            </a:r>
+            <a:endParaRPr lang="nl-BE" dirty="0"/>
+          </a:p>
+        </p:txBody>
+      </p:sp>
     </p:spTree>
     <p:extLst>
       <p:ext uri="{BB962C8B-B14F-4D97-AF65-F5344CB8AC3E}">
@@ -16789,6 +16922,13 @@
   <p:clrMapOvr>
     <a:masterClrMapping/>
   </p:clrMapOvr>
+  <p:timing>
+    <p:tnLst>
+      <p:par>
+        <p:cTn id="1" dur="indefinite" restart="never" nodeType="tmRoot"/>
+      </p:par>
+    </p:tnLst>
+  </p:timing>
 </p:sld>
 </file>
 
@@ -16891,8 +17031,17 @@
           <a:p>
             <a:r>
               <a:rPr lang="en-BE" dirty="0"/>
-              <a:t>Elaboration of the static prototype into interactive viz</a:t>
+              <a:t>Elaboration of the static prototype into </a:t>
             </a:r>
+            <a:r>
+              <a:rPr lang="en-BE" dirty="0" smtClean="0"/>
+              <a:t>an interactive visualization </a:t>
+            </a:r>
+            <a:r>
+              <a:rPr lang="en-BE" i="1" dirty="0" smtClean="0"/>
+              <a:t>(cfr. demo)</a:t>
+            </a:r>
+            <a:endParaRPr lang="en-BE" i="1" dirty="0"/>
           </a:p>
           <a:p>
             <a:pPr lvl="1"/>
@@ -16924,9 +17073,14 @@
           </a:p>
           <a:p>
             <a:r>
-              <a:rPr lang="en-BE" dirty="0"/>
-              <a:t>Evaluation</a:t>
+              <a:rPr lang="en-BE" dirty="0" smtClean="0"/>
+              <a:t>Evaluation </a:t>
             </a:r>
+            <a:r>
+              <a:rPr lang="en-BE" i="1" dirty="0" smtClean="0"/>
+              <a:t>(cfr. final part of this presentation)</a:t>
+            </a:r>
+            <a:endParaRPr lang="en-BE" i="1" dirty="0"/>
           </a:p>
           <a:p>
             <a:pPr lvl="1"/>
@@ -17007,6 +17161,13 @@
   <p:clrMapOvr>
     <a:masterClrMapping/>
   </p:clrMapOvr>
+  <p:timing>
+    <p:tnLst>
+      <p:par>
+        <p:cTn id="1" dur="indefinite" restart="never" nodeType="tmRoot"/>
+      </p:par>
+    </p:tnLst>
+  </p:timing>
 </p:sld>
 </file>
 
@@ -17079,6 +17240,13 @@
   <p:clrMapOvr>
     <a:masterClrMapping/>
   </p:clrMapOvr>
+  <p:timing>
+    <p:tnLst>
+      <p:par>
+        <p:cTn id="1" dur="indefinite" restart="never" nodeType="tmRoot"/>
+      </p:par>
+    </p:tnLst>
+  </p:timing>
 </p:sld>
 </file>
 
@@ -17163,7 +17331,7 @@
                 <a14:useLocalDpi xmlns:a14="http://schemas.microsoft.com/office/drawing/2010/main" val="0"/>
               </a:ext>
               <a:ext uri="{96DAC541-7B7A-43D3-8B79-37D633B846F1}">
-                <asvg:svgBlip xmlns="" xmlns:asvg="http://schemas.microsoft.com/office/drawing/2016/SVG/main" r:embed="rId3"/>
+                <asvg:svgBlip xmlns:asvg="http://schemas.microsoft.com/office/drawing/2016/SVG/main" xmlns="" r:embed="rId3"/>
               </a:ext>
             </a:extLst>
           </a:blip>
@@ -17773,6 +17941,13 @@
   <p:clrMapOvr>
     <a:masterClrMapping/>
   </p:clrMapOvr>
+  <p:timing>
+    <p:tnLst>
+      <p:par>
+        <p:cTn id="1" dur="indefinite" restart="never" nodeType="tmRoot"/>
+      </p:par>
+    </p:tnLst>
+  </p:timing>
 </p:sld>
 </file>
 
@@ -17941,6 +18116,13 @@
   <p:clrMapOvr>
     <a:masterClrMapping/>
   </p:clrMapOvr>
+  <p:timing>
+    <p:tnLst>
+      <p:par>
+        <p:cTn id="1" dur="indefinite" restart="never" nodeType="tmRoot"/>
+      </p:par>
+    </p:tnLst>
+  </p:timing>
 </p:sld>
 </file>
 
@@ -17977,7 +18159,7 @@
                 <a16:creationId xmlns:a16="http://schemas.microsoft.com/office/drawing/2014/main" id="{45B71F80-1F92-4074-84D9-16A062B215B3}"/>
               </a:ext>
               <a:ext uri="{C183D7F6-B498-43B3-948B-1728B52AA6E4}">
-                <adec:decorative xmlns="" xmlns:adec="http://schemas.microsoft.com/office/drawing/2017/decorative" val="1"/>
+                <adec:decorative xmlns:adec="http://schemas.microsoft.com/office/drawing/2017/decorative" xmlns="" val="1"/>
               </a:ext>
             </a:extLst>
           </p:cNvPr>
@@ -18082,7 +18264,7 @@
                 <a16:creationId xmlns:a16="http://schemas.microsoft.com/office/drawing/2014/main" id="{7209C9DA-6E0D-46D9-8275-C52222D8CCAC}"/>
               </a:ext>
               <a:ext uri="{C183D7F6-B498-43B3-948B-1728B52AA6E4}">
-                <adec:decorative xmlns="" xmlns:adec="http://schemas.microsoft.com/office/drawing/2017/decorative" val="1"/>
+                <adec:decorative xmlns:adec="http://schemas.microsoft.com/office/drawing/2017/decorative" xmlns="" val="1"/>
               </a:ext>
             </a:extLst>
           </p:cNvPr>
@@ -18147,7 +18329,7 @@
                 <a16:creationId xmlns:a16="http://schemas.microsoft.com/office/drawing/2014/main" id="{3EB57A4D-E0D0-46DA-B339-F24CA46FA70B}"/>
               </a:ext>
               <a:ext uri="{C183D7F6-B498-43B3-948B-1728B52AA6E4}">
-                <adec:decorative xmlns="" xmlns:adec="http://schemas.microsoft.com/office/drawing/2017/decorative" val="1"/>
+                <adec:decorative xmlns:adec="http://schemas.microsoft.com/office/drawing/2017/decorative" xmlns="" val="1"/>
               </a:ext>
             </a:extLst>
           </p:cNvPr>
@@ -18655,14 +18837,21 @@
   <p:clrMapOvr>
     <a:masterClrMapping/>
   </p:clrMapOvr>
-  <mc:AlternateContent xmlns:mc="http://schemas.openxmlformats.org/markup-compatibility/2006">
-    <mc:Choice xmlns:p14="http://schemas.microsoft.com/office/powerpoint/2010/main" Requires="p14">
+  <mc:AlternateContent xmlns:mc="http://schemas.openxmlformats.org/markup-compatibility/2006" xmlns:p14="http://schemas.microsoft.com/office/powerpoint/2010/main">
+    <mc:Choice Requires="p14">
       <p:transition spd="slow" p14:dur="2000"/>
     </mc:Choice>
-    <mc:Fallback>
+    <mc:Fallback xmlns="">
       <p:transition spd="slow"/>
     </mc:Fallback>
   </mc:AlternateContent>
+  <p:timing>
+    <p:tnLst>
+      <p:par>
+        <p:cTn id="1" dur="indefinite" restart="never" nodeType="tmRoot"/>
+      </p:par>
+    </p:tnLst>
+  </p:timing>
 </p:sld>
 </file>
 
@@ -18741,7 +18930,7 @@
                 <a16:creationId xmlns:a16="http://schemas.microsoft.com/office/drawing/2014/main" id="{4FA2E581-75F6-ED53-4C73-35F4031413CB}"/>
               </a:ext>
               <a:ext uri="{C183D7F6-B498-43B3-948B-1728B52AA6E4}">
-                <adec:decorative xmlns="" xmlns:adec="http://schemas.microsoft.com/office/drawing/2017/decorative" val="1"/>
+                <adec:decorative xmlns:adec="http://schemas.microsoft.com/office/drawing/2017/decorative" xmlns="" val="1"/>
               </a:ext>
             </a:extLst>
           </p:cNvPr>
@@ -18916,7 +19105,7 @@
                 <a16:creationId xmlns:a16="http://schemas.microsoft.com/office/drawing/2014/main" id="{3E3F0872-2E5E-4902-E06E-D16B11A5FF92}"/>
               </a:ext>
               <a:ext uri="{C183D7F6-B498-43B3-948B-1728B52AA6E4}">
-                <adec:decorative xmlns="" xmlns:adec="http://schemas.microsoft.com/office/drawing/2017/decorative" val="1"/>
+                <adec:decorative xmlns:adec="http://schemas.microsoft.com/office/drawing/2017/decorative" xmlns="" val="1"/>
               </a:ext>
             </a:extLst>
           </p:cNvPr>
@@ -18979,7 +19168,7 @@
                 <a16:creationId xmlns:a16="http://schemas.microsoft.com/office/drawing/2014/main" id="{F56ABBA3-7390-B1BF-0A7B-35721A2A2692}"/>
               </a:ext>
               <a:ext uri="{C183D7F6-B498-43B3-948B-1728B52AA6E4}">
-                <adec:decorative xmlns="" xmlns:adec="http://schemas.microsoft.com/office/drawing/2017/decorative" val="1"/>
+                <adec:decorative xmlns:adec="http://schemas.microsoft.com/office/drawing/2017/decorative" xmlns="" val="1"/>
               </a:ext>
             </a:extLst>
           </p:cNvPr>
@@ -19494,11 +19683,11 @@
   <p:clrMapOvr>
     <a:masterClrMapping/>
   </p:clrMapOvr>
-  <mc:AlternateContent xmlns:mc="http://schemas.openxmlformats.org/markup-compatibility/2006">
-    <mc:Choice xmlns:p14="http://schemas.microsoft.com/office/powerpoint/2010/main" Requires="p14">
+  <mc:AlternateContent xmlns:mc="http://schemas.openxmlformats.org/markup-compatibility/2006" xmlns:p14="http://schemas.microsoft.com/office/powerpoint/2010/main">
+    <mc:Choice Requires="p14">
       <p:transition spd="slow" p14:dur="2000"/>
     </mc:Choice>
-    <mc:Fallback>
+    <mc:Fallback xmlns="">
       <p:transition spd="slow"/>
     </mc:Fallback>
   </mc:AlternateContent>

</xml_diff>

<commit_message>
Updated the final presentation slides
Added a diverging stacked bar chart
</commit_message>
<xml_diff>
--- a/doc/final_presentation/group2_final_presentation.pptx
+++ b/doc/final_presentation/group2_final_presentation.pptx
@@ -5,7 +5,7 @@
     <p:sldMasterId id="2147483725" r:id="rId1"/>
   </p:sldMasterIdLst>
   <p:notesMasterIdLst>
-    <p:notesMasterId r:id="rId15"/>
+    <p:notesMasterId r:id="rId11"/>
   </p:notesMasterIdLst>
   <p:sldIdLst>
     <p:sldId id="256" r:id="rId2"/>
@@ -15,12 +15,8 @@
     <p:sldId id="276" r:id="rId6"/>
     <p:sldId id="283" r:id="rId7"/>
     <p:sldId id="291" r:id="rId8"/>
-    <p:sldId id="285" r:id="rId9"/>
-    <p:sldId id="286" r:id="rId10"/>
-    <p:sldId id="287" r:id="rId11"/>
-    <p:sldId id="288" r:id="rId12"/>
-    <p:sldId id="289" r:id="rId13"/>
-    <p:sldId id="290" r:id="rId14"/>
+    <p:sldId id="289" r:id="rId9"/>
+    <p:sldId id="290" r:id="rId10"/>
   </p:sldIdLst>
   <p:sldSz cx="12192000" cy="6858000"/>
   <p:notesSz cx="6858000" cy="9144000"/>
@@ -131,10 +127,6 @@
             <p14:sldId id="276"/>
             <p14:sldId id="283"/>
             <p14:sldId id="291"/>
-            <p14:sldId id="285"/>
-            <p14:sldId id="286"/>
-            <p14:sldId id="287"/>
-            <p14:sldId id="288"/>
             <p14:sldId id="289"/>
             <p14:sldId id="290"/>
           </p14:sldIdLst>
@@ -1158,13 +1150,6 @@
         </dgm:presLayoutVars>
       </dgm:prSet>
       <dgm:spPr/>
-      <dgm:t>
-        <a:bodyPr/>
-        <a:lstStyle/>
-        <a:p>
-          <a:endParaRPr lang="en-US"/>
-        </a:p>
-      </dgm:t>
     </dgm:pt>
     <dgm:pt modelId="{2EFCD128-DCC2-4286-9232-36E1B3ED6CA0}" type="pres">
       <dgm:prSet presAssocID="{DBDEAB8B-332B-41F1-A799-43D90ECB1015}" presName="Accent3" presStyleCnt="0"/>
@@ -1181,13 +1166,6 @@
     <dgm:pt modelId="{EC40BB10-33D2-41DE-BFB9-6F8071D9B3E9}" type="pres">
       <dgm:prSet presAssocID="{DBDEAB8B-332B-41F1-A799-43D90ECB1015}" presName="ParentBackground" presStyleLbl="fgAcc1" presStyleIdx="0" presStyleCnt="3"/>
       <dgm:spPr/>
-      <dgm:t>
-        <a:bodyPr/>
-        <a:lstStyle/>
-        <a:p>
-          <a:endParaRPr lang="en-US"/>
-        </a:p>
-      </dgm:t>
     </dgm:pt>
     <dgm:pt modelId="{F86FDBC4-0D82-4E13-BAF5-ADEA9174D8C4}" type="pres">
       <dgm:prSet presAssocID="{DBDEAB8B-332B-41F1-A799-43D90ECB1015}" presName="Parent3" presStyleLbl="revTx" presStyleIdx="0" presStyleCnt="0">
@@ -1198,13 +1176,6 @@
         </dgm:presLayoutVars>
       </dgm:prSet>
       <dgm:spPr/>
-      <dgm:t>
-        <a:bodyPr/>
-        <a:lstStyle/>
-        <a:p>
-          <a:endParaRPr lang="en-US"/>
-        </a:p>
-      </dgm:t>
     </dgm:pt>
     <dgm:pt modelId="{7E1570D7-B951-4E5D-B9B9-C7078C965529}" type="pres">
       <dgm:prSet presAssocID="{FEF6190E-AFCA-416F-BF44-B19788D9826A}" presName="Accent2" presStyleCnt="0"/>
@@ -1221,13 +1192,6 @@
     <dgm:pt modelId="{1F659436-CFA6-4F1E-BDDD-80ED0A99DDAD}" type="pres">
       <dgm:prSet presAssocID="{FEF6190E-AFCA-416F-BF44-B19788D9826A}" presName="ParentBackground" presStyleLbl="fgAcc1" presStyleIdx="1" presStyleCnt="3"/>
       <dgm:spPr/>
-      <dgm:t>
-        <a:bodyPr/>
-        <a:lstStyle/>
-        <a:p>
-          <a:endParaRPr lang="en-US"/>
-        </a:p>
-      </dgm:t>
     </dgm:pt>
     <dgm:pt modelId="{8B03924C-CA4A-43D1-9AF9-51049015AF2D}" type="pres">
       <dgm:prSet presAssocID="{FEF6190E-AFCA-416F-BF44-B19788D9826A}" presName="Parent2" presStyleLbl="revTx" presStyleIdx="0" presStyleCnt="0">
@@ -1238,13 +1202,6 @@
         </dgm:presLayoutVars>
       </dgm:prSet>
       <dgm:spPr/>
-      <dgm:t>
-        <a:bodyPr/>
-        <a:lstStyle/>
-        <a:p>
-          <a:endParaRPr lang="en-US"/>
-        </a:p>
-      </dgm:t>
     </dgm:pt>
     <dgm:pt modelId="{E8C05631-90A8-4605-93F7-44BD7EE2513D}" type="pres">
       <dgm:prSet presAssocID="{F79930F1-A495-45AF-8468-7A6AB0DE0C65}" presName="Accent1" presStyleCnt="0"/>
@@ -1261,13 +1218,6 @@
     <dgm:pt modelId="{17254B1B-5D87-443C-BD0E-3757B845A2A5}" type="pres">
       <dgm:prSet presAssocID="{F79930F1-A495-45AF-8468-7A6AB0DE0C65}" presName="ParentBackground" presStyleLbl="fgAcc1" presStyleIdx="2" presStyleCnt="3"/>
       <dgm:spPr/>
-      <dgm:t>
-        <a:bodyPr/>
-        <a:lstStyle/>
-        <a:p>
-          <a:endParaRPr lang="en-US"/>
-        </a:p>
-      </dgm:t>
     </dgm:pt>
     <dgm:pt modelId="{EB758256-8D0D-49E2-BDFA-1923E3DD20EF}" type="pres">
       <dgm:prSet presAssocID="{F79930F1-A495-45AF-8468-7A6AB0DE0C65}" presName="Parent1" presStyleLbl="revTx" presStyleIdx="0" presStyleCnt="0">
@@ -1278,25 +1228,18 @@
         </dgm:presLayoutVars>
       </dgm:prSet>
       <dgm:spPr/>
-      <dgm:t>
-        <a:bodyPr/>
-        <a:lstStyle/>
-        <a:p>
-          <a:endParaRPr lang="en-US"/>
-        </a:p>
-      </dgm:t>
     </dgm:pt>
   </dgm:ptLst>
   <dgm:cxnLst>
+    <dgm:cxn modelId="{0F883401-26D3-40EB-A4F5-47AE1BD57704}" srcId="{F4EE3F02-E642-4B26-A15B-4677CB1DA6BB}" destId="{FEF6190E-AFCA-416F-BF44-B19788D9826A}" srcOrd="1" destOrd="0" parTransId="{B01C70AD-028E-478A-B339-65149FE638DC}" sibTransId="{E76A5BEB-E632-4B13-A724-C7BC4158B615}"/>
+    <dgm:cxn modelId="{AC6F8413-F5B1-4593-AFAC-FEF9A0BB2FF5}" type="presOf" srcId="{FEF6190E-AFCA-416F-BF44-B19788D9826A}" destId="{8B03924C-CA4A-43D1-9AF9-51049015AF2D}" srcOrd="1" destOrd="0" presId="urn:microsoft.com/office/officeart/2011/layout/CircleProcess"/>
+    <dgm:cxn modelId="{3FF75425-D136-4187-959C-354CBE0A0789}" type="presOf" srcId="{FEF6190E-AFCA-416F-BF44-B19788D9826A}" destId="{1F659436-CFA6-4F1E-BDDD-80ED0A99DDAD}" srcOrd="0" destOrd="0" presId="urn:microsoft.com/office/officeart/2011/layout/CircleProcess"/>
+    <dgm:cxn modelId="{CB049439-1F1C-4E84-8034-8E2858172C5E}" type="presOf" srcId="{DBDEAB8B-332B-41F1-A799-43D90ECB1015}" destId="{F86FDBC4-0D82-4E13-BAF5-ADEA9174D8C4}" srcOrd="1" destOrd="0" presId="urn:microsoft.com/office/officeart/2011/layout/CircleProcess"/>
+    <dgm:cxn modelId="{D0079744-E1B9-4D2E-A168-AE25E53D9218}" srcId="{F4EE3F02-E642-4B26-A15B-4677CB1DA6BB}" destId="{DBDEAB8B-332B-41F1-A799-43D90ECB1015}" srcOrd="2" destOrd="0" parTransId="{A9067AB2-A5CA-4F91-87A3-577DFEBDC4D4}" sibTransId="{67884484-E539-4750-9814-E8017B2B3E6F}"/>
+    <dgm:cxn modelId="{DB7BF65B-F37F-4AF4-B829-7DF9D97B2D40}" srcId="{F4EE3F02-E642-4B26-A15B-4677CB1DA6BB}" destId="{F79930F1-A495-45AF-8468-7A6AB0DE0C65}" srcOrd="0" destOrd="0" parTransId="{72CF608E-D01B-46C3-8F9E-2DE7A465EEFF}" sibTransId="{F84AD876-1CF1-48A9-B275-82512C427385}"/>
+    <dgm:cxn modelId="{4E56A186-795C-42D7-B5ED-9A14C6AEF0E9}" type="presOf" srcId="{F4EE3F02-E642-4B26-A15B-4677CB1DA6BB}" destId="{88805F5D-6F15-463D-9CDF-5739D2BCE5A7}" srcOrd="0" destOrd="0" presId="urn:microsoft.com/office/officeart/2011/layout/CircleProcess"/>
     <dgm:cxn modelId="{F4031B8B-3F79-41A8-9370-C8F8DC205EB1}" type="presOf" srcId="{F79930F1-A495-45AF-8468-7A6AB0DE0C65}" destId="{EB758256-8D0D-49E2-BDFA-1923E3DD20EF}" srcOrd="1" destOrd="0" presId="urn:microsoft.com/office/officeart/2011/layout/CircleProcess"/>
     <dgm:cxn modelId="{4AA525CE-A7A0-4680-BEBE-F146376CB686}" type="presOf" srcId="{DBDEAB8B-332B-41F1-A799-43D90ECB1015}" destId="{EC40BB10-33D2-41DE-BFB9-6F8071D9B3E9}" srcOrd="0" destOrd="0" presId="urn:microsoft.com/office/officeart/2011/layout/CircleProcess"/>
-    <dgm:cxn modelId="{3FF75425-D136-4187-959C-354CBE0A0789}" type="presOf" srcId="{FEF6190E-AFCA-416F-BF44-B19788D9826A}" destId="{1F659436-CFA6-4F1E-BDDD-80ED0A99DDAD}" srcOrd="0" destOrd="0" presId="urn:microsoft.com/office/officeart/2011/layout/CircleProcess"/>
-    <dgm:cxn modelId="{AC6F8413-F5B1-4593-AFAC-FEF9A0BB2FF5}" type="presOf" srcId="{FEF6190E-AFCA-416F-BF44-B19788D9826A}" destId="{8B03924C-CA4A-43D1-9AF9-51049015AF2D}" srcOrd="1" destOrd="0" presId="urn:microsoft.com/office/officeart/2011/layout/CircleProcess"/>
-    <dgm:cxn modelId="{0F883401-26D3-40EB-A4F5-47AE1BD57704}" srcId="{F4EE3F02-E642-4B26-A15B-4677CB1DA6BB}" destId="{FEF6190E-AFCA-416F-BF44-B19788D9826A}" srcOrd="1" destOrd="0" parTransId="{B01C70AD-028E-478A-B339-65149FE638DC}" sibTransId="{E76A5BEB-E632-4B13-A724-C7BC4158B615}"/>
-    <dgm:cxn modelId="{DB7BF65B-F37F-4AF4-B829-7DF9D97B2D40}" srcId="{F4EE3F02-E642-4B26-A15B-4677CB1DA6BB}" destId="{F79930F1-A495-45AF-8468-7A6AB0DE0C65}" srcOrd="0" destOrd="0" parTransId="{72CF608E-D01B-46C3-8F9E-2DE7A465EEFF}" sibTransId="{F84AD876-1CF1-48A9-B275-82512C427385}"/>
-    <dgm:cxn modelId="{4E56A186-795C-42D7-B5ED-9A14C6AEF0E9}" type="presOf" srcId="{F4EE3F02-E642-4B26-A15B-4677CB1DA6BB}" destId="{88805F5D-6F15-463D-9CDF-5739D2BCE5A7}" srcOrd="0" destOrd="0" presId="urn:microsoft.com/office/officeart/2011/layout/CircleProcess"/>
-    <dgm:cxn modelId="{D0079744-E1B9-4D2E-A168-AE25E53D9218}" srcId="{F4EE3F02-E642-4B26-A15B-4677CB1DA6BB}" destId="{DBDEAB8B-332B-41F1-A799-43D90ECB1015}" srcOrd="2" destOrd="0" parTransId="{A9067AB2-A5CA-4F91-87A3-577DFEBDC4D4}" sibTransId="{67884484-E539-4750-9814-E8017B2B3E6F}"/>
-    <dgm:cxn modelId="{CB049439-1F1C-4E84-8034-8E2858172C5E}" type="presOf" srcId="{DBDEAB8B-332B-41F1-A799-43D90ECB1015}" destId="{F86FDBC4-0D82-4E13-BAF5-ADEA9174D8C4}" srcOrd="1" destOrd="0" presId="urn:microsoft.com/office/officeart/2011/layout/CircleProcess"/>
     <dgm:cxn modelId="{D53B0EFA-5485-4182-8E0A-71611ED5D237}" type="presOf" srcId="{F79930F1-A495-45AF-8468-7A6AB0DE0C65}" destId="{17254B1B-5D87-443C-BD0E-3757B845A2A5}" srcOrd="0" destOrd="0" presId="urn:microsoft.com/office/officeart/2011/layout/CircleProcess"/>
     <dgm:cxn modelId="{5BC7D30E-ECE7-4D6C-B08C-D1D2F271DED6}" type="presParOf" srcId="{88805F5D-6F15-463D-9CDF-5739D2BCE5A7}" destId="{2EFCD128-DCC2-4286-9232-36E1B3ED6CA0}" srcOrd="0" destOrd="0" presId="urn:microsoft.com/office/officeart/2011/layout/CircleProcess"/>
     <dgm:cxn modelId="{E26E0CCA-6AB7-4619-8AE5-0786CE37796E}" type="presParOf" srcId="{2EFCD128-DCC2-4286-9232-36E1B3ED6CA0}" destId="{A456F57C-8F34-4927-B7AE-45A36289B6C1}" srcOrd="0" destOrd="0" presId="urn:microsoft.com/office/officeart/2011/layout/CircleProcess"/>
@@ -1436,7 +1379,7 @@
         </a:bodyPr>
         <a:lstStyle/>
         <a:p>
-          <a:pPr lvl="0" algn="ctr" defTabSz="711200">
+          <a:pPr marL="0" lvl="0" indent="0" algn="ctr" defTabSz="711200">
             <a:lnSpc>
               <a:spcPct val="90000"/>
             </a:lnSpc>
@@ -1446,6 +1389,7 @@
             <a:spcAft>
               <a:spcPct val="35000"/>
             </a:spcAft>
+            <a:buNone/>
           </a:pPr>
           <a:r>
             <a:rPr lang="en-BE" sz="1600" kern="1200" dirty="0"/>
@@ -1565,7 +1509,7 @@
         </a:bodyPr>
         <a:lstStyle/>
         <a:p>
-          <a:pPr lvl="0" algn="ctr" defTabSz="711200">
+          <a:pPr marL="0" lvl="0" indent="0" algn="ctr" defTabSz="711200">
             <a:lnSpc>
               <a:spcPct val="90000"/>
             </a:lnSpc>
@@ -1575,6 +1519,7 @@
             <a:spcAft>
               <a:spcPct val="35000"/>
             </a:spcAft>
+            <a:buNone/>
           </a:pPr>
           <a:r>
             <a:rPr lang="en-BE" sz="1600" kern="1200" dirty="0"/>
@@ -1694,7 +1639,7 @@
         </a:bodyPr>
         <a:lstStyle/>
         <a:p>
-          <a:pPr lvl="0" algn="ctr" defTabSz="711200">
+          <a:pPr marL="0" lvl="0" indent="0" algn="ctr" defTabSz="711200">
             <a:lnSpc>
               <a:spcPct val="90000"/>
             </a:lnSpc>
@@ -1704,6 +1649,7 @@
             <a:spcAft>
               <a:spcPct val="35000"/>
             </a:spcAft>
+            <a:buNone/>
           </a:pPr>
           <a:r>
             <a:rPr lang="en-BE" sz="1600" kern="1200" dirty="0"/>
@@ -8121,7 +8067,7 @@
           <a:p>
             <a:fld id="{C8393262-5C38-4D61-8BA6-F5F5A23922DC}" type="slidenum">
               <a:rPr lang="nl-BE" smtClean="0"/>
-              <a:t>12</a:t>
+              <a:t>8</a:t>
             </a:fld>
             <a:endParaRPr lang="nl-BE"/>
           </a:p>
@@ -14102,1945 +14048,6 @@
   <p:clrMapOvr>
     <a:masterClrMapping/>
   </p:clrMapOvr>
-  <p:timing>
-    <p:tnLst>
-      <p:par>
-        <p:cTn id="1" dur="indefinite" restart="never" nodeType="tmRoot"/>
-      </p:par>
-    </p:tnLst>
-  </p:timing>
-</p:sld>
-</file>
-
-<file path=ppt/slides/slide10.xml><?xml version="1.0" encoding="utf-8"?>
-<p:sld xmlns:a="http://schemas.openxmlformats.org/drawingml/2006/main" xmlns:r="http://schemas.openxmlformats.org/officeDocument/2006/relationships" xmlns:p="http://schemas.openxmlformats.org/presentationml/2006/main" show="0">
-  <p:cSld>
-    <p:spTree>
-      <p:nvGrpSpPr>
-        <p:cNvPr id="1" name=""/>
-        <p:cNvGrpSpPr/>
-        <p:nvPr/>
-      </p:nvGrpSpPr>
-      <p:grpSpPr>
-        <a:xfrm>
-          <a:off x="0" y="0"/>
-          <a:ext cx="0" cy="0"/>
-          <a:chOff x="0" y="0"/>
-          <a:chExt cx="0" cy="0"/>
-        </a:xfrm>
-      </p:grpSpPr>
-      <p:sp>
-        <p:nvSpPr>
-          <p:cNvPr id="2" name="Title 1">
-            <a:extLst>
-              <a:ext uri="{FF2B5EF4-FFF2-40B4-BE49-F238E27FC236}">
-                <a16:creationId xmlns:a16="http://schemas.microsoft.com/office/drawing/2014/main" id="{A10A3EE6-9503-A301-DB0E-7D39DBCE4C1B}"/>
-              </a:ext>
-            </a:extLst>
-          </p:cNvPr>
-          <p:cNvSpPr>
-            <a:spLocks noGrp="1"/>
-          </p:cNvSpPr>
-          <p:nvPr>
-            <p:ph type="title"/>
-          </p:nvPr>
-        </p:nvSpPr>
-        <p:spPr/>
-        <p:txBody>
-          <a:bodyPr/>
-          <a:lstStyle/>
-          <a:p>
-            <a:endParaRPr lang="en-BD" dirty="0"/>
-          </a:p>
-        </p:txBody>
-      </p:sp>
-      <p:sp>
-        <p:nvSpPr>
-          <p:cNvPr id="3" name="Content Placeholder 2">
-            <a:extLst>
-              <a:ext uri="{FF2B5EF4-FFF2-40B4-BE49-F238E27FC236}">
-                <a16:creationId xmlns:a16="http://schemas.microsoft.com/office/drawing/2014/main" id="{B66972E6-A170-3126-0758-2C8F6864B228}"/>
-              </a:ext>
-            </a:extLst>
-          </p:cNvPr>
-          <p:cNvSpPr>
-            <a:spLocks noGrp="1"/>
-          </p:cNvSpPr>
-          <p:nvPr>
-            <p:ph idx="1"/>
-          </p:nvPr>
-        </p:nvSpPr>
-        <p:spPr/>
-        <p:txBody>
-          <a:bodyPr/>
-          <a:lstStyle/>
-          <a:p>
-            <a:endParaRPr lang="en-BD" dirty="0"/>
-          </a:p>
-        </p:txBody>
-      </p:sp>
-      <p:sp useBgFill="1">
-        <p:nvSpPr>
-          <p:cNvPr id="5" name="Rectangle 4">
-            <a:extLst>
-              <a:ext uri="{FF2B5EF4-FFF2-40B4-BE49-F238E27FC236}">
-                <a16:creationId xmlns:a16="http://schemas.microsoft.com/office/drawing/2014/main" id="{0A6CF53F-A77A-BC5A-BC49-AF84A8D08E0A}"/>
-              </a:ext>
-              <a:ext uri="{C183D7F6-B498-43B3-948B-1728B52AA6E4}">
-                <adec:decorative xmlns:adec="http://schemas.microsoft.com/office/drawing/2017/decorative" xmlns="" val="1"/>
-              </a:ext>
-            </a:extLst>
-          </p:cNvPr>
-          <p:cNvSpPr/>
-          <p:nvPr>
-            <p:extLst>
-              <p:ext uri="{386F3935-93C4-4BCD-93E2-E3B085C9AB24}">
-                <p16:designElem xmlns:p16="http://schemas.microsoft.com/office/powerpoint/2015/main" val="1"/>
-              </p:ext>
-            </p:extLst>
-          </p:nvPr>
-        </p:nvSpPr>
-        <p:spPr>
-          <a:xfrm>
-            <a:off x="0" y="0"/>
-            <a:ext cx="12192000" cy="6858000"/>
-          </a:xfrm>
-          <a:prstGeom prst="rect">
-            <a:avLst/>
-          </a:prstGeom>
-          <a:ln>
-            <a:noFill/>
-          </a:ln>
-        </p:spPr>
-        <p:style>
-          <a:lnRef idx="2">
-            <a:schemeClr val="accent1">
-              <a:shade val="50000"/>
-            </a:schemeClr>
-          </a:lnRef>
-          <a:fillRef idx="1">
-            <a:schemeClr val="accent1"/>
-          </a:fillRef>
-          <a:effectRef idx="0">
-            <a:schemeClr val="accent1"/>
-          </a:effectRef>
-          <a:fontRef idx="minor">
-            <a:schemeClr val="lt1"/>
-          </a:fontRef>
-        </p:style>
-        <p:txBody>
-          <a:bodyPr rtlCol="0" anchor="ctr"/>
-          <a:lstStyle/>
-          <a:p>
-            <a:pPr algn="ctr"/>
-            <a:endParaRPr lang="en-US"/>
-          </a:p>
-        </p:txBody>
-      </p:sp>
-      <p:sp>
-        <p:nvSpPr>
-          <p:cNvPr id="6" name="Title 1">
-            <a:extLst>
-              <a:ext uri="{FF2B5EF4-FFF2-40B4-BE49-F238E27FC236}">
-                <a16:creationId xmlns:a16="http://schemas.microsoft.com/office/drawing/2014/main" id="{F7369AF3-31BA-545D-FC7E-9D90DCA4EAD9}"/>
-              </a:ext>
-            </a:extLst>
-          </p:cNvPr>
-          <p:cNvSpPr txBox="1">
-            <a:spLocks/>
-          </p:cNvSpPr>
-          <p:nvPr/>
-        </p:nvSpPr>
-        <p:spPr>
-          <a:xfrm>
-            <a:off x="1286933" y="609600"/>
-            <a:ext cx="10197494" cy="1099457"/>
-          </a:xfrm>
-          <a:prstGeom prst="rect">
-            <a:avLst/>
-          </a:prstGeom>
-        </p:spPr>
-        <p:txBody>
-          <a:bodyPr vert="horz" lIns="91440" tIns="45720" rIns="91440" bIns="45720" rtlCol="0" anchor="t">
-            <a:normAutofit fontScale="85000" lnSpcReduction="20000"/>
-          </a:bodyPr>
-          <a:lstStyle>
-            <a:lvl1pPr algn="l" defTabSz="457200" rtl="0" eaLnBrk="1" latinLnBrk="0" hangingPunct="1">
-              <a:spcBef>
-                <a:spcPct val="0"/>
-              </a:spcBef>
-              <a:buNone/>
-              <a:defRPr sz="3600" kern="1200">
-                <a:solidFill>
-                  <a:schemeClr val="accent1"/>
-                </a:solidFill>
-                <a:latin typeface="+mj-lt"/>
-                <a:ea typeface="+mj-ea"/>
-                <a:cs typeface="+mj-cs"/>
-              </a:defRPr>
-            </a:lvl1pPr>
-            <a:lvl2pPr eaLnBrk="1" hangingPunct="1">
-              <a:defRPr>
-                <a:solidFill>
-                  <a:schemeClr val="tx2"/>
-                </a:solidFill>
-              </a:defRPr>
-            </a:lvl2pPr>
-            <a:lvl3pPr eaLnBrk="1" hangingPunct="1">
-              <a:defRPr>
-                <a:solidFill>
-                  <a:schemeClr val="tx2"/>
-                </a:solidFill>
-              </a:defRPr>
-            </a:lvl3pPr>
-            <a:lvl4pPr eaLnBrk="1" hangingPunct="1">
-              <a:defRPr>
-                <a:solidFill>
-                  <a:schemeClr val="tx2"/>
-                </a:solidFill>
-              </a:defRPr>
-            </a:lvl4pPr>
-            <a:lvl5pPr eaLnBrk="1" hangingPunct="1">
-              <a:defRPr>
-                <a:solidFill>
-                  <a:schemeClr val="tx2"/>
-                </a:solidFill>
-              </a:defRPr>
-            </a:lvl5pPr>
-            <a:lvl6pPr eaLnBrk="1" hangingPunct="1">
-              <a:defRPr>
-                <a:solidFill>
-                  <a:schemeClr val="tx2"/>
-                </a:solidFill>
-              </a:defRPr>
-            </a:lvl6pPr>
-            <a:lvl7pPr eaLnBrk="1" hangingPunct="1">
-              <a:defRPr>
-                <a:solidFill>
-                  <a:schemeClr val="tx2"/>
-                </a:solidFill>
-              </a:defRPr>
-            </a:lvl7pPr>
-            <a:lvl8pPr eaLnBrk="1" hangingPunct="1">
-              <a:defRPr>
-                <a:solidFill>
-                  <a:schemeClr val="tx2"/>
-                </a:solidFill>
-              </a:defRPr>
-            </a:lvl8pPr>
-            <a:lvl9pPr eaLnBrk="1" hangingPunct="1">
-              <a:defRPr>
-                <a:solidFill>
-                  <a:schemeClr val="tx2"/>
-                </a:solidFill>
-              </a:defRPr>
-            </a:lvl9pPr>
-          </a:lstStyle>
-          <a:p>
-            <a:pPr>
-              <a:lnSpc>
-                <a:spcPct val="90000"/>
-              </a:lnSpc>
-            </a:pPr>
-            <a:r>
-              <a:rPr lang="en-BD" dirty="0"/>
-              <a:t>Question 3: </a:t>
-            </a:r>
-            <a:r>
-              <a:rPr lang="en-GB" dirty="0"/>
-              <a:t>Can you list the top 20 largest operating wind farms in India commissioned between 2010 and 2020?</a:t>
-            </a:r>
-            <a:endParaRPr lang="en-BD" dirty="0"/>
-          </a:p>
-        </p:txBody>
-      </p:sp>
-      <p:sp>
-        <p:nvSpPr>
-          <p:cNvPr id="7" name="Isosceles Triangle 10">
-            <a:extLst>
-              <a:ext uri="{FF2B5EF4-FFF2-40B4-BE49-F238E27FC236}">
-                <a16:creationId xmlns:a16="http://schemas.microsoft.com/office/drawing/2014/main" id="{92023AC7-42E6-EAE3-475C-2143D5E94AAD}"/>
-              </a:ext>
-              <a:ext uri="{C183D7F6-B498-43B3-948B-1728B52AA6E4}">
-                <adec:decorative xmlns:adec="http://schemas.microsoft.com/office/drawing/2017/decorative" xmlns="" val="1"/>
-              </a:ext>
-            </a:extLst>
-          </p:cNvPr>
-          <p:cNvSpPr/>
-          <p:nvPr>
-            <p:extLst>
-              <p:ext uri="{386F3935-93C4-4BCD-93E2-E3B085C9AB24}">
-                <p16:designElem xmlns:p16="http://schemas.microsoft.com/office/powerpoint/2015/main" val="1"/>
-              </p:ext>
-            </p:extLst>
-          </p:nvPr>
-        </p:nvSpPr>
-        <p:spPr>
-          <a:xfrm rot="10800000">
-            <a:off x="0" y="0"/>
-            <a:ext cx="842596" cy="5666154"/>
-          </a:xfrm>
-          <a:prstGeom prst="triangle">
-            <a:avLst>
-              <a:gd name="adj" fmla="val 100000"/>
-            </a:avLst>
-          </a:prstGeom>
-          <a:solidFill>
-            <a:schemeClr val="accent1">
-              <a:alpha val="85000"/>
-            </a:schemeClr>
-          </a:solidFill>
-          <a:ln>
-            <a:noFill/>
-          </a:ln>
-          <a:effectLst/>
-        </p:spPr>
-        <p:style>
-          <a:lnRef idx="1">
-            <a:schemeClr val="accent1"/>
-          </a:lnRef>
-          <a:fillRef idx="3">
-            <a:schemeClr val="accent1"/>
-          </a:fillRef>
-          <a:effectRef idx="2">
-            <a:schemeClr val="accent1"/>
-          </a:effectRef>
-          <a:fontRef idx="minor">
-            <a:schemeClr val="lt1"/>
-          </a:fontRef>
-        </p:style>
-        <p:txBody>
-          <a:bodyPr/>
-          <a:lstStyle/>
-          <a:p>
-            <a:endParaRPr lang="en-BD"/>
-          </a:p>
-        </p:txBody>
-      </p:sp>
-      <p:sp>
-        <p:nvSpPr>
-          <p:cNvPr id="8" name="Isosceles Triangle 12">
-            <a:extLst>
-              <a:ext uri="{FF2B5EF4-FFF2-40B4-BE49-F238E27FC236}">
-                <a16:creationId xmlns:a16="http://schemas.microsoft.com/office/drawing/2014/main" id="{D7726E50-EA96-2EED-330C-CC64F838CDDD}"/>
-              </a:ext>
-              <a:ext uri="{C183D7F6-B498-43B3-948B-1728B52AA6E4}">
-                <adec:decorative xmlns:adec="http://schemas.microsoft.com/office/drawing/2017/decorative" xmlns="" val="1"/>
-              </a:ext>
-            </a:extLst>
-          </p:cNvPr>
-          <p:cNvSpPr/>
-          <p:nvPr>
-            <p:extLst>
-              <p:ext uri="{386F3935-93C4-4BCD-93E2-E3B085C9AB24}">
-                <p16:designElem xmlns:p16="http://schemas.microsoft.com/office/powerpoint/2015/main" val="1"/>
-              </p:ext>
-            </p:extLst>
-          </p:nvPr>
-        </p:nvSpPr>
-        <p:spPr>
-          <a:xfrm flipH="1">
-            <a:off x="11743267" y="4013200"/>
-            <a:ext cx="448733" cy="2844800"/>
-          </a:xfrm>
-          <a:prstGeom prst="triangle">
-            <a:avLst>
-              <a:gd name="adj" fmla="val 0"/>
-            </a:avLst>
-          </a:prstGeom>
-          <a:solidFill>
-            <a:schemeClr val="accent1">
-              <a:alpha val="85000"/>
-            </a:schemeClr>
-          </a:solidFill>
-          <a:ln>
-            <a:noFill/>
-          </a:ln>
-          <a:effectLst/>
-        </p:spPr>
-        <p:style>
-          <a:lnRef idx="1">
-            <a:schemeClr val="accent1"/>
-          </a:lnRef>
-          <a:fillRef idx="3">
-            <a:schemeClr val="accent1"/>
-          </a:fillRef>
-          <a:effectRef idx="2">
-            <a:schemeClr val="accent1"/>
-          </a:effectRef>
-          <a:fontRef idx="minor">
-            <a:schemeClr val="lt1"/>
-          </a:fontRef>
-        </p:style>
-        <p:txBody>
-          <a:bodyPr/>
-          <a:lstStyle/>
-          <a:p>
-            <a:endParaRPr lang="en-BD"/>
-          </a:p>
-        </p:txBody>
-      </p:sp>
-      <p:graphicFrame>
-        <p:nvGraphicFramePr>
-          <p:cNvPr id="9" name="Content Placeholder 3">
-            <a:extLst>
-              <a:ext uri="{FF2B5EF4-FFF2-40B4-BE49-F238E27FC236}">
-                <a16:creationId xmlns:a16="http://schemas.microsoft.com/office/drawing/2014/main" id="{83411758-59EF-721A-70D1-902C7892A51C}"/>
-              </a:ext>
-            </a:extLst>
-          </p:cNvPr>
-          <p:cNvGraphicFramePr>
-            <a:graphicFrameLocks/>
-          </p:cNvGraphicFramePr>
-          <p:nvPr>
-            <p:extLst>
-              <p:ext uri="{D42A27DB-BD31-4B8C-83A1-F6EECF244321}">
-                <p14:modId xmlns:p14="http://schemas.microsoft.com/office/powerpoint/2010/main" val="1322439863"/>
-              </p:ext>
-            </p:extLst>
-          </p:nvPr>
-        </p:nvGraphicFramePr>
-        <p:xfrm>
-          <a:off x="1286933" y="2276751"/>
-          <a:ext cx="9618134" cy="4013878"/>
-        </p:xfrm>
-        <a:graphic>
-          <a:graphicData uri="http://schemas.openxmlformats.org/drawingml/2006/table">
-            <a:tbl>
-              <a:tblPr firstRow="1" bandRow="1">
-                <a:tableStyleId>{5C22544A-7EE6-4342-B048-85BDC9FD1C3A}</a:tableStyleId>
-              </a:tblPr>
-              <a:tblGrid>
-                <a:gridCol w="2375882">
-                  <a:extLst>
-                    <a:ext uri="{9D8B030D-6E8A-4147-A177-3AD203B41FA5}">
-                      <a16:colId xmlns:a16="http://schemas.microsoft.com/office/drawing/2014/main" val="202611479"/>
-                    </a:ext>
-                  </a:extLst>
-                </a:gridCol>
-                <a:gridCol w="2382289">
-                  <a:extLst>
-                    <a:ext uri="{9D8B030D-6E8A-4147-A177-3AD203B41FA5}">
-                      <a16:colId xmlns:a16="http://schemas.microsoft.com/office/drawing/2014/main" val="3194293325"/>
-                    </a:ext>
-                  </a:extLst>
-                </a:gridCol>
-                <a:gridCol w="2375882">
-                  <a:extLst>
-                    <a:ext uri="{9D8B030D-6E8A-4147-A177-3AD203B41FA5}">
-                      <a16:colId xmlns:a16="http://schemas.microsoft.com/office/drawing/2014/main" val="1025652441"/>
-                    </a:ext>
-                  </a:extLst>
-                </a:gridCol>
-                <a:gridCol w="2484081">
-                  <a:extLst>
-                    <a:ext uri="{9D8B030D-6E8A-4147-A177-3AD203B41FA5}">
-                      <a16:colId xmlns:a16="http://schemas.microsoft.com/office/drawing/2014/main" val="1682647431"/>
-                    </a:ext>
-                  </a:extLst>
-                </a:gridCol>
-              </a:tblGrid>
-              <a:tr h="444797">
-                <a:tc>
-                  <a:txBody>
-                    <a:bodyPr/>
-                    <a:lstStyle/>
-                    <a:p>
-                      <a:endParaRPr lang="en-BD" sz="2000"/>
-                    </a:p>
-                  </a:txBody>
-                  <a:tcPr marL="101090" marR="101090" marT="50545" marB="50545"/>
-                </a:tc>
-                <a:tc>
-                  <a:txBody>
-                    <a:bodyPr/>
-                    <a:lstStyle/>
-                    <a:p>
-                      <a:r>
-                        <a:rPr lang="en-BD" sz="2000"/>
-                        <a:t>Canditate 1</a:t>
-                      </a:r>
-                    </a:p>
-                  </a:txBody>
-                  <a:tcPr marL="101090" marR="101090" marT="50545" marB="50545"/>
-                </a:tc>
-                <a:tc>
-                  <a:txBody>
-                    <a:bodyPr/>
-                    <a:lstStyle/>
-                    <a:p>
-                      <a:pPr marL="0" marR="0" lvl="0" indent="0" algn="l" defTabSz="457200" rtl="0" eaLnBrk="1" fontAlgn="auto" latinLnBrk="0" hangingPunct="1">
-                        <a:lnSpc>
-                          <a:spcPct val="100000"/>
-                        </a:lnSpc>
-                        <a:spcBef>
-                          <a:spcPts val="0"/>
-                        </a:spcBef>
-                        <a:spcAft>
-                          <a:spcPts val="0"/>
-                        </a:spcAft>
-                        <a:buClrTx/>
-                        <a:buSzTx/>
-                        <a:buFontTx/>
-                        <a:buNone/>
-                        <a:tabLst/>
-                        <a:defRPr/>
-                      </a:pPr>
-                      <a:r>
-                        <a:rPr lang="en-BD" sz="2000"/>
-                        <a:t>Canditate 2</a:t>
-                      </a:r>
-                    </a:p>
-                  </a:txBody>
-                  <a:tcPr marL="101090" marR="101090" marT="50545" marB="50545"/>
-                </a:tc>
-                <a:tc>
-                  <a:txBody>
-                    <a:bodyPr/>
-                    <a:lstStyle/>
-                    <a:p>
-                      <a:pPr marL="0" marR="0" lvl="0" indent="0" algn="l" defTabSz="457200" rtl="0" eaLnBrk="1" fontAlgn="auto" latinLnBrk="0" hangingPunct="1">
-                        <a:lnSpc>
-                          <a:spcPct val="100000"/>
-                        </a:lnSpc>
-                        <a:spcBef>
-                          <a:spcPts val="0"/>
-                        </a:spcBef>
-                        <a:spcAft>
-                          <a:spcPts val="0"/>
-                        </a:spcAft>
-                        <a:buClrTx/>
-                        <a:buSzTx/>
-                        <a:buFontTx/>
-                        <a:buNone/>
-                        <a:tabLst/>
-                        <a:defRPr/>
-                      </a:pPr>
-                      <a:r>
-                        <a:rPr lang="en-BD" sz="2000"/>
-                        <a:t>Canditate 3</a:t>
-                      </a:r>
-                    </a:p>
-                  </a:txBody>
-                  <a:tcPr marL="101090" marR="101090" marT="50545" marB="50545"/>
-                </a:tc>
-                <a:extLst>
-                  <a:ext uri="{0D108BD9-81ED-4DB2-BD59-A6C34878D82A}">
-                    <a16:rowId xmlns:a16="http://schemas.microsoft.com/office/drawing/2014/main" val="527192938"/>
-                  </a:ext>
-                </a:extLst>
-              </a:tr>
-              <a:tr h="444797">
-                <a:tc>
-                  <a:txBody>
-                    <a:bodyPr/>
-                    <a:lstStyle/>
-                    <a:p>
-                      <a:r>
-                        <a:rPr lang="en-BD" sz="2000"/>
-                        <a:t>Understanding</a:t>
-                      </a:r>
-                    </a:p>
-                  </a:txBody>
-                  <a:tcPr marL="101090" marR="101090" marT="50545" marB="50545"/>
-                </a:tc>
-                <a:tc>
-                  <a:txBody>
-                    <a:bodyPr/>
-                    <a:lstStyle/>
-                    <a:p>
-                      <a:r>
-                        <a:rPr lang="en-BD" sz="2000" dirty="0"/>
-                        <a:t>Yes</a:t>
-                      </a:r>
-                    </a:p>
-                  </a:txBody>
-                  <a:tcPr marL="101090" marR="101090" marT="50545" marB="50545"/>
-                </a:tc>
-                <a:tc>
-                  <a:txBody>
-                    <a:bodyPr/>
-                    <a:lstStyle/>
-                    <a:p>
-                      <a:r>
-                        <a:rPr lang="en-BD" sz="2000" dirty="0"/>
-                        <a:t>Yes</a:t>
-                      </a:r>
-                    </a:p>
-                  </a:txBody>
-                  <a:tcPr marL="101090" marR="101090" marT="50545" marB="50545"/>
-                </a:tc>
-                <a:tc>
-                  <a:txBody>
-                    <a:bodyPr/>
-                    <a:lstStyle/>
-                    <a:p>
-                      <a:r>
-                        <a:rPr lang="en-BD" sz="2000" dirty="0"/>
-                        <a:t>Yes</a:t>
-                      </a:r>
-                    </a:p>
-                  </a:txBody>
-                  <a:tcPr marL="101090" marR="101090" marT="50545" marB="50545"/>
-                </a:tc>
-                <a:extLst>
-                  <a:ext uri="{0D108BD9-81ED-4DB2-BD59-A6C34878D82A}">
-                    <a16:rowId xmlns:a16="http://schemas.microsoft.com/office/drawing/2014/main" val="1649843950"/>
-                  </a:ext>
-                </a:extLst>
-              </a:tr>
-              <a:tr h="444797">
-                <a:tc>
-                  <a:txBody>
-                    <a:bodyPr/>
-                    <a:lstStyle/>
-                    <a:p>
-                      <a:r>
-                        <a:rPr lang="en-BD" sz="2000"/>
-                        <a:t>Support Needed</a:t>
-                      </a:r>
-                    </a:p>
-                  </a:txBody>
-                  <a:tcPr marL="101090" marR="101090" marT="50545" marB="50545"/>
-                </a:tc>
-                <a:tc>
-                  <a:txBody>
-                    <a:bodyPr/>
-                    <a:lstStyle/>
-                    <a:p>
-                      <a:r>
-                        <a:rPr lang="en-BD" sz="2000" dirty="0"/>
-                        <a:t>Yes</a:t>
-                      </a:r>
-                    </a:p>
-                  </a:txBody>
-                  <a:tcPr marL="101090" marR="101090" marT="50545" marB="50545"/>
-                </a:tc>
-                <a:tc>
-                  <a:txBody>
-                    <a:bodyPr/>
-                    <a:lstStyle/>
-                    <a:p>
-                      <a:r>
-                        <a:rPr lang="en-BD" sz="2000" dirty="0"/>
-                        <a:t>No</a:t>
-                      </a:r>
-                    </a:p>
-                  </a:txBody>
-                  <a:tcPr marL="101090" marR="101090" marT="50545" marB="50545"/>
-                </a:tc>
-                <a:tc>
-                  <a:txBody>
-                    <a:bodyPr/>
-                    <a:lstStyle/>
-                    <a:p>
-                      <a:r>
-                        <a:rPr lang="en-BD" sz="2000" dirty="0"/>
-                        <a:t>Yes</a:t>
-                      </a:r>
-                    </a:p>
-                  </a:txBody>
-                  <a:tcPr marL="101090" marR="101090" marT="50545" marB="50545"/>
-                </a:tc>
-                <a:extLst>
-                  <a:ext uri="{0D108BD9-81ED-4DB2-BD59-A6C34878D82A}">
-                    <a16:rowId xmlns:a16="http://schemas.microsoft.com/office/drawing/2014/main" val="967924198"/>
-                  </a:ext>
-                </a:extLst>
-              </a:tr>
-              <a:tr h="444797">
-                <a:tc>
-                  <a:txBody>
-                    <a:bodyPr/>
-                    <a:lstStyle/>
-                    <a:p>
-                      <a:r>
-                        <a:rPr lang="en-BD" sz="2000"/>
-                        <a:t>Correct Answer</a:t>
-                      </a:r>
-                    </a:p>
-                  </a:txBody>
-                  <a:tcPr marL="101090" marR="101090" marT="50545" marB="50545"/>
-                </a:tc>
-                <a:tc>
-                  <a:txBody>
-                    <a:bodyPr/>
-                    <a:lstStyle/>
-                    <a:p>
-                      <a:r>
-                        <a:rPr lang="en-BD" sz="2000"/>
-                        <a:t>Yes</a:t>
-                      </a:r>
-                    </a:p>
-                  </a:txBody>
-                  <a:tcPr marL="101090" marR="101090" marT="50545" marB="50545"/>
-                </a:tc>
-                <a:tc>
-                  <a:txBody>
-                    <a:bodyPr/>
-                    <a:lstStyle/>
-                    <a:p>
-                      <a:r>
-                        <a:rPr lang="en-BD" sz="2000" dirty="0"/>
-                        <a:t>Yes</a:t>
-                      </a:r>
-                    </a:p>
-                  </a:txBody>
-                  <a:tcPr marL="101090" marR="101090" marT="50545" marB="50545"/>
-                </a:tc>
-                <a:tc>
-                  <a:txBody>
-                    <a:bodyPr/>
-                    <a:lstStyle/>
-                    <a:p>
-                      <a:r>
-                        <a:rPr lang="en-BD" sz="2000" dirty="0"/>
-                        <a:t>Yes</a:t>
-                      </a:r>
-                    </a:p>
-                  </a:txBody>
-                  <a:tcPr marL="101090" marR="101090" marT="50545" marB="50545"/>
-                </a:tc>
-                <a:extLst>
-                  <a:ext uri="{0D108BD9-81ED-4DB2-BD59-A6C34878D82A}">
-                    <a16:rowId xmlns:a16="http://schemas.microsoft.com/office/drawing/2014/main" val="1442486957"/>
-                  </a:ext>
-                </a:extLst>
-              </a:tr>
-              <a:tr h="1657879">
-                <a:tc>
-                  <a:txBody>
-                    <a:bodyPr/>
-                    <a:lstStyle/>
-                    <a:p>
-                      <a:r>
-                        <a:rPr lang="en-BD" sz="2000" dirty="0"/>
-                        <a:t>Feedback</a:t>
-                      </a:r>
-                    </a:p>
-                  </a:txBody>
-                  <a:tcPr marL="101090" marR="101090" marT="50545" marB="50545"/>
-                </a:tc>
-                <a:tc>
-                  <a:txBody>
-                    <a:bodyPr/>
-                    <a:lstStyle/>
-                    <a:p>
-                      <a:r>
-                        <a:rPr lang="en-GB" sz="2000" dirty="0"/>
-                        <a:t>Time slider obvious; finding country not obvious as you first have to select continent &amp; subregion.</a:t>
-                      </a:r>
-                      <a:endParaRPr lang="en-BD" sz="2000" dirty="0"/>
-                    </a:p>
-                  </a:txBody>
-                  <a:tcPr marL="101090" marR="101090" marT="50545" marB="50545"/>
-                </a:tc>
-                <a:tc>
-                  <a:txBody>
-                    <a:bodyPr/>
-                    <a:lstStyle/>
-                    <a:p>
-                      <a:r>
-                        <a:rPr lang="en-GB" sz="2000" dirty="0"/>
-                        <a:t>Subregion has to be chosen first in order to select a country; not everyone knows the subregions.</a:t>
-                      </a:r>
-                      <a:endParaRPr lang="en-BD" sz="2000" dirty="0"/>
-                    </a:p>
-                  </a:txBody>
-                  <a:tcPr marL="101090" marR="101090" marT="50545" marB="50545"/>
-                </a:tc>
-                <a:tc>
-                  <a:txBody>
-                    <a:bodyPr/>
-                    <a:lstStyle/>
-                    <a:p>
-                      <a:r>
-                        <a:rPr lang="en-GB" sz="2000" dirty="0"/>
-                        <a:t>Unclear to first select a subregion before being able to select country; would be better to directly select a country.</a:t>
-                      </a:r>
-                      <a:endParaRPr lang="en-BD" sz="2000" dirty="0"/>
-                    </a:p>
-                  </a:txBody>
-                  <a:tcPr marL="101090" marR="101090" marT="50545" marB="50545"/>
-                </a:tc>
-                <a:extLst>
-                  <a:ext uri="{0D108BD9-81ED-4DB2-BD59-A6C34878D82A}">
-                    <a16:rowId xmlns:a16="http://schemas.microsoft.com/office/drawing/2014/main" val="2529668582"/>
-                  </a:ext>
-                </a:extLst>
-              </a:tr>
-            </a:tbl>
-          </a:graphicData>
-        </a:graphic>
-      </p:graphicFrame>
-      <p:sp>
-        <p:nvSpPr>
-          <p:cNvPr id="10" name="Rounded Rectangle 9"/>
-          <p:cNvSpPr/>
-          <p:nvPr/>
-        </p:nvSpPr>
-        <p:spPr>
-          <a:xfrm>
-            <a:off x="1192306" y="2967318"/>
-            <a:ext cx="2770094" cy="1685364"/>
-          </a:xfrm>
-          <a:prstGeom prst="roundRect">
-            <a:avLst/>
-          </a:prstGeom>
-          <a:solidFill>
-            <a:schemeClr val="accent4"/>
-          </a:solidFill>
-          <a:ln>
-            <a:noFill/>
-          </a:ln>
-        </p:spPr>
-        <p:style>
-          <a:lnRef idx="0">
-            <a:scrgbClr r="0" g="0" b="0"/>
-          </a:lnRef>
-          <a:fillRef idx="0">
-            <a:scrgbClr r="0" g="0" b="0"/>
-          </a:fillRef>
-          <a:effectRef idx="0">
-            <a:scrgbClr r="0" g="0" b="0"/>
-          </a:effectRef>
-          <a:fontRef idx="minor">
-            <a:schemeClr val="lt1"/>
-          </a:fontRef>
-        </p:style>
-        <p:txBody>
-          <a:bodyPr rtlCol="0" anchor="ctr"/>
-          <a:lstStyle/>
-          <a:p>
-            <a:pPr algn="ctr"/>
-            <a:r>
-              <a:rPr lang="en-BE" dirty="0" smtClean="0"/>
-              <a:t>remove</a:t>
-            </a:r>
-            <a:endParaRPr lang="nl-BE" dirty="0"/>
-          </a:p>
-        </p:txBody>
-      </p:sp>
-    </p:spTree>
-    <p:extLst>
-      <p:ext uri="{BB962C8B-B14F-4D97-AF65-F5344CB8AC3E}">
-        <p14:creationId xmlns:p14="http://schemas.microsoft.com/office/powerpoint/2010/main" val="3758622901"/>
-      </p:ext>
-    </p:extLst>
-  </p:cSld>
-  <p:clrMapOvr>
-    <a:masterClrMapping/>
-  </p:clrMapOvr>
-  <mc:AlternateContent xmlns:mc="http://schemas.openxmlformats.org/markup-compatibility/2006" xmlns:p14="http://schemas.microsoft.com/office/powerpoint/2010/main">
-    <mc:Choice Requires="p14">
-      <p:transition spd="slow" p14:dur="2000"/>
-    </mc:Choice>
-    <mc:Fallback xmlns="">
-      <p:transition spd="slow"/>
-    </mc:Fallback>
-  </mc:AlternateContent>
-</p:sld>
-</file>
-
-<file path=ppt/slides/slide11.xml><?xml version="1.0" encoding="utf-8"?>
-<p:sld xmlns:a="http://schemas.openxmlformats.org/drawingml/2006/main" xmlns:r="http://schemas.openxmlformats.org/officeDocument/2006/relationships" xmlns:p="http://schemas.openxmlformats.org/presentationml/2006/main" show="0">
-  <p:cSld>
-    <p:spTree>
-      <p:nvGrpSpPr>
-        <p:cNvPr id="1" name=""/>
-        <p:cNvGrpSpPr/>
-        <p:nvPr/>
-      </p:nvGrpSpPr>
-      <p:grpSpPr>
-        <a:xfrm>
-          <a:off x="0" y="0"/>
-          <a:ext cx="0" cy="0"/>
-          <a:chOff x="0" y="0"/>
-          <a:chExt cx="0" cy="0"/>
-        </a:xfrm>
-      </p:grpSpPr>
-      <p:sp>
-        <p:nvSpPr>
-          <p:cNvPr id="2" name="Title 1">
-            <a:extLst>
-              <a:ext uri="{FF2B5EF4-FFF2-40B4-BE49-F238E27FC236}">
-                <a16:creationId xmlns:a16="http://schemas.microsoft.com/office/drawing/2014/main" id="{F75D421F-26D1-2EDB-D2A3-C698EBAB343E}"/>
-              </a:ext>
-            </a:extLst>
-          </p:cNvPr>
-          <p:cNvSpPr>
-            <a:spLocks noGrp="1"/>
-          </p:cNvSpPr>
-          <p:nvPr>
-            <p:ph type="title"/>
-          </p:nvPr>
-        </p:nvSpPr>
-        <p:spPr/>
-        <p:txBody>
-          <a:bodyPr/>
-          <a:lstStyle/>
-          <a:p>
-            <a:endParaRPr lang="en-BD" dirty="0"/>
-          </a:p>
-        </p:txBody>
-      </p:sp>
-      <p:sp>
-        <p:nvSpPr>
-          <p:cNvPr id="3" name="Content Placeholder 2">
-            <a:extLst>
-              <a:ext uri="{FF2B5EF4-FFF2-40B4-BE49-F238E27FC236}">
-                <a16:creationId xmlns:a16="http://schemas.microsoft.com/office/drawing/2014/main" id="{BF5103B4-8F2C-7935-B58D-48A564F0E74E}"/>
-              </a:ext>
-            </a:extLst>
-          </p:cNvPr>
-          <p:cNvSpPr>
-            <a:spLocks noGrp="1"/>
-          </p:cNvSpPr>
-          <p:nvPr>
-            <p:ph idx="1"/>
-          </p:nvPr>
-        </p:nvSpPr>
-        <p:spPr/>
-        <p:txBody>
-          <a:bodyPr/>
-          <a:lstStyle/>
-          <a:p>
-            <a:endParaRPr lang="en-BD"/>
-          </a:p>
-        </p:txBody>
-      </p:sp>
-      <p:sp useBgFill="1">
-        <p:nvSpPr>
-          <p:cNvPr id="4" name="Rectangle 3">
-            <a:extLst>
-              <a:ext uri="{FF2B5EF4-FFF2-40B4-BE49-F238E27FC236}">
-                <a16:creationId xmlns:a16="http://schemas.microsoft.com/office/drawing/2014/main" id="{5E720A80-D45D-04A9-5008-657DA6B31B43}"/>
-              </a:ext>
-              <a:ext uri="{C183D7F6-B498-43B3-948B-1728B52AA6E4}">
-                <adec:decorative xmlns:adec="http://schemas.microsoft.com/office/drawing/2017/decorative" xmlns="" val="1"/>
-              </a:ext>
-            </a:extLst>
-          </p:cNvPr>
-          <p:cNvSpPr/>
-          <p:nvPr>
-            <p:extLst>
-              <p:ext uri="{386F3935-93C4-4BCD-93E2-E3B085C9AB24}">
-                <p16:designElem xmlns:p16="http://schemas.microsoft.com/office/powerpoint/2015/main" val="1"/>
-              </p:ext>
-            </p:extLst>
-          </p:nvPr>
-        </p:nvSpPr>
-        <p:spPr>
-          <a:xfrm>
-            <a:off x="0" y="0"/>
-            <a:ext cx="12192000" cy="6858000"/>
-          </a:xfrm>
-          <a:prstGeom prst="rect">
-            <a:avLst/>
-          </a:prstGeom>
-          <a:ln>
-            <a:noFill/>
-          </a:ln>
-        </p:spPr>
-        <p:style>
-          <a:lnRef idx="2">
-            <a:schemeClr val="accent1">
-              <a:shade val="50000"/>
-            </a:schemeClr>
-          </a:lnRef>
-          <a:fillRef idx="1">
-            <a:schemeClr val="accent1"/>
-          </a:fillRef>
-          <a:effectRef idx="0">
-            <a:schemeClr val="accent1"/>
-          </a:effectRef>
-          <a:fontRef idx="minor">
-            <a:schemeClr val="lt1"/>
-          </a:fontRef>
-        </p:style>
-        <p:txBody>
-          <a:bodyPr rtlCol="0" anchor="ctr"/>
-          <a:lstStyle/>
-          <a:p>
-            <a:pPr algn="ctr"/>
-            <a:endParaRPr lang="en-US"/>
-          </a:p>
-        </p:txBody>
-      </p:sp>
-      <p:sp>
-        <p:nvSpPr>
-          <p:cNvPr id="5" name="Title 1">
-            <a:extLst>
-              <a:ext uri="{FF2B5EF4-FFF2-40B4-BE49-F238E27FC236}">
-                <a16:creationId xmlns:a16="http://schemas.microsoft.com/office/drawing/2014/main" id="{B25E16DD-ACB0-8BCA-8856-4F5B73A4A11B}"/>
-              </a:ext>
-            </a:extLst>
-          </p:cNvPr>
-          <p:cNvSpPr txBox="1">
-            <a:spLocks/>
-          </p:cNvSpPr>
-          <p:nvPr/>
-        </p:nvSpPr>
-        <p:spPr>
-          <a:xfrm>
-            <a:off x="1286933" y="609600"/>
-            <a:ext cx="10197494" cy="1099457"/>
-          </a:xfrm>
-          <a:prstGeom prst="rect">
-            <a:avLst/>
-          </a:prstGeom>
-        </p:spPr>
-        <p:txBody>
-          <a:bodyPr vert="horz" lIns="91440" tIns="45720" rIns="91440" bIns="45720" rtlCol="0" anchor="t">
-            <a:normAutofit fontScale="85000" lnSpcReduction="10000"/>
-          </a:bodyPr>
-          <a:lstStyle>
-            <a:lvl1pPr algn="l" defTabSz="457200" rtl="0" eaLnBrk="1" latinLnBrk="0" hangingPunct="1">
-              <a:spcBef>
-                <a:spcPct val="0"/>
-              </a:spcBef>
-              <a:buNone/>
-              <a:defRPr sz="3600" kern="1200">
-                <a:solidFill>
-                  <a:schemeClr val="accent1"/>
-                </a:solidFill>
-                <a:latin typeface="+mj-lt"/>
-                <a:ea typeface="+mj-ea"/>
-                <a:cs typeface="+mj-cs"/>
-              </a:defRPr>
-            </a:lvl1pPr>
-            <a:lvl2pPr eaLnBrk="1" hangingPunct="1">
-              <a:defRPr>
-                <a:solidFill>
-                  <a:schemeClr val="tx2"/>
-                </a:solidFill>
-              </a:defRPr>
-            </a:lvl2pPr>
-            <a:lvl3pPr eaLnBrk="1" hangingPunct="1">
-              <a:defRPr>
-                <a:solidFill>
-                  <a:schemeClr val="tx2"/>
-                </a:solidFill>
-              </a:defRPr>
-            </a:lvl3pPr>
-            <a:lvl4pPr eaLnBrk="1" hangingPunct="1">
-              <a:defRPr>
-                <a:solidFill>
-                  <a:schemeClr val="tx2"/>
-                </a:solidFill>
-              </a:defRPr>
-            </a:lvl4pPr>
-            <a:lvl5pPr eaLnBrk="1" hangingPunct="1">
-              <a:defRPr>
-                <a:solidFill>
-                  <a:schemeClr val="tx2"/>
-                </a:solidFill>
-              </a:defRPr>
-            </a:lvl5pPr>
-            <a:lvl6pPr eaLnBrk="1" hangingPunct="1">
-              <a:defRPr>
-                <a:solidFill>
-                  <a:schemeClr val="tx2"/>
-                </a:solidFill>
-              </a:defRPr>
-            </a:lvl6pPr>
-            <a:lvl7pPr eaLnBrk="1" hangingPunct="1">
-              <a:defRPr>
-                <a:solidFill>
-                  <a:schemeClr val="tx2"/>
-                </a:solidFill>
-              </a:defRPr>
-            </a:lvl7pPr>
-            <a:lvl8pPr eaLnBrk="1" hangingPunct="1">
-              <a:defRPr>
-                <a:solidFill>
-                  <a:schemeClr val="tx2"/>
-                </a:solidFill>
-              </a:defRPr>
-            </a:lvl8pPr>
-            <a:lvl9pPr eaLnBrk="1" hangingPunct="1">
-              <a:defRPr>
-                <a:solidFill>
-                  <a:schemeClr val="tx2"/>
-                </a:solidFill>
-              </a:defRPr>
-            </a:lvl9pPr>
-          </a:lstStyle>
-          <a:p>
-            <a:pPr>
-              <a:lnSpc>
-                <a:spcPct val="90000"/>
-              </a:lnSpc>
-            </a:pPr>
-            <a:r>
-              <a:rPr lang="en-BD" dirty="0"/>
-              <a:t>Question 4: </a:t>
-            </a:r>
-            <a:r>
-              <a:rPr lang="en-GB" dirty="0"/>
-              <a:t>Can you locate the 3rd largest onshore wind farm in South Africa and retrieve its capacity value?</a:t>
-            </a:r>
-            <a:endParaRPr lang="en-BD" dirty="0"/>
-          </a:p>
-        </p:txBody>
-      </p:sp>
-      <p:sp>
-        <p:nvSpPr>
-          <p:cNvPr id="6" name="Isosceles Triangle 10">
-            <a:extLst>
-              <a:ext uri="{FF2B5EF4-FFF2-40B4-BE49-F238E27FC236}">
-                <a16:creationId xmlns:a16="http://schemas.microsoft.com/office/drawing/2014/main" id="{13C78BF2-B10B-0854-AA59-8C858E8BB9B7}"/>
-              </a:ext>
-              <a:ext uri="{C183D7F6-B498-43B3-948B-1728B52AA6E4}">
-                <adec:decorative xmlns:adec="http://schemas.microsoft.com/office/drawing/2017/decorative" xmlns="" val="1"/>
-              </a:ext>
-            </a:extLst>
-          </p:cNvPr>
-          <p:cNvSpPr/>
-          <p:nvPr>
-            <p:extLst>
-              <p:ext uri="{386F3935-93C4-4BCD-93E2-E3B085C9AB24}">
-                <p16:designElem xmlns:p16="http://schemas.microsoft.com/office/powerpoint/2015/main" val="1"/>
-              </p:ext>
-            </p:extLst>
-          </p:nvPr>
-        </p:nvSpPr>
-        <p:spPr>
-          <a:xfrm rot="10800000">
-            <a:off x="0" y="0"/>
-            <a:ext cx="842596" cy="5666154"/>
-          </a:xfrm>
-          <a:prstGeom prst="triangle">
-            <a:avLst>
-              <a:gd name="adj" fmla="val 100000"/>
-            </a:avLst>
-          </a:prstGeom>
-          <a:solidFill>
-            <a:schemeClr val="accent1">
-              <a:alpha val="85000"/>
-            </a:schemeClr>
-          </a:solidFill>
-          <a:ln>
-            <a:noFill/>
-          </a:ln>
-          <a:effectLst/>
-        </p:spPr>
-        <p:style>
-          <a:lnRef idx="1">
-            <a:schemeClr val="accent1"/>
-          </a:lnRef>
-          <a:fillRef idx="3">
-            <a:schemeClr val="accent1"/>
-          </a:fillRef>
-          <a:effectRef idx="2">
-            <a:schemeClr val="accent1"/>
-          </a:effectRef>
-          <a:fontRef idx="minor">
-            <a:schemeClr val="lt1"/>
-          </a:fontRef>
-        </p:style>
-        <p:txBody>
-          <a:bodyPr/>
-          <a:lstStyle/>
-          <a:p>
-            <a:endParaRPr lang="en-BD"/>
-          </a:p>
-        </p:txBody>
-      </p:sp>
-      <p:sp>
-        <p:nvSpPr>
-          <p:cNvPr id="7" name="Isosceles Triangle 12">
-            <a:extLst>
-              <a:ext uri="{FF2B5EF4-FFF2-40B4-BE49-F238E27FC236}">
-                <a16:creationId xmlns:a16="http://schemas.microsoft.com/office/drawing/2014/main" id="{0BADB147-AF64-59D3-6EC2-F084B030DB4D}"/>
-              </a:ext>
-              <a:ext uri="{C183D7F6-B498-43B3-948B-1728B52AA6E4}">
-                <adec:decorative xmlns:adec="http://schemas.microsoft.com/office/drawing/2017/decorative" xmlns="" val="1"/>
-              </a:ext>
-            </a:extLst>
-          </p:cNvPr>
-          <p:cNvSpPr/>
-          <p:nvPr>
-            <p:extLst>
-              <p:ext uri="{386F3935-93C4-4BCD-93E2-E3B085C9AB24}">
-                <p16:designElem xmlns:p16="http://schemas.microsoft.com/office/powerpoint/2015/main" val="1"/>
-              </p:ext>
-            </p:extLst>
-          </p:nvPr>
-        </p:nvSpPr>
-        <p:spPr>
-          <a:xfrm flipH="1">
-            <a:off x="11743267" y="4013200"/>
-            <a:ext cx="448733" cy="2844800"/>
-          </a:xfrm>
-          <a:prstGeom prst="triangle">
-            <a:avLst>
-              <a:gd name="adj" fmla="val 0"/>
-            </a:avLst>
-          </a:prstGeom>
-          <a:solidFill>
-            <a:schemeClr val="accent1">
-              <a:alpha val="85000"/>
-            </a:schemeClr>
-          </a:solidFill>
-          <a:ln>
-            <a:noFill/>
-          </a:ln>
-          <a:effectLst/>
-        </p:spPr>
-        <p:style>
-          <a:lnRef idx="1">
-            <a:schemeClr val="accent1"/>
-          </a:lnRef>
-          <a:fillRef idx="3">
-            <a:schemeClr val="accent1"/>
-          </a:fillRef>
-          <a:effectRef idx="2">
-            <a:schemeClr val="accent1"/>
-          </a:effectRef>
-          <a:fontRef idx="minor">
-            <a:schemeClr val="lt1"/>
-          </a:fontRef>
-        </p:style>
-        <p:txBody>
-          <a:bodyPr/>
-          <a:lstStyle/>
-          <a:p>
-            <a:endParaRPr lang="en-BD"/>
-          </a:p>
-        </p:txBody>
-      </p:sp>
-      <p:graphicFrame>
-        <p:nvGraphicFramePr>
-          <p:cNvPr id="8" name="Content Placeholder 3">
-            <a:extLst>
-              <a:ext uri="{FF2B5EF4-FFF2-40B4-BE49-F238E27FC236}">
-                <a16:creationId xmlns:a16="http://schemas.microsoft.com/office/drawing/2014/main" id="{9F6D2C12-EC74-5082-F730-7858244F8A84}"/>
-              </a:ext>
-            </a:extLst>
-          </p:cNvPr>
-          <p:cNvGraphicFramePr>
-            <a:graphicFrameLocks/>
-          </p:cNvGraphicFramePr>
-          <p:nvPr>
-            <p:extLst>
-              <p:ext uri="{D42A27DB-BD31-4B8C-83A1-F6EECF244321}">
-                <p14:modId xmlns:p14="http://schemas.microsoft.com/office/powerpoint/2010/main" val="3473485067"/>
-              </p:ext>
-            </p:extLst>
-          </p:nvPr>
-        </p:nvGraphicFramePr>
-        <p:xfrm>
-          <a:off x="1286933" y="2276751"/>
-          <a:ext cx="9618134" cy="3709078"/>
-        </p:xfrm>
-        <a:graphic>
-          <a:graphicData uri="http://schemas.openxmlformats.org/drawingml/2006/table">
-            <a:tbl>
-              <a:tblPr firstRow="1" bandRow="1">
-                <a:tableStyleId>{5C22544A-7EE6-4342-B048-85BDC9FD1C3A}</a:tableStyleId>
-              </a:tblPr>
-              <a:tblGrid>
-                <a:gridCol w="2375882">
-                  <a:extLst>
-                    <a:ext uri="{9D8B030D-6E8A-4147-A177-3AD203B41FA5}">
-                      <a16:colId xmlns:a16="http://schemas.microsoft.com/office/drawing/2014/main" val="202611479"/>
-                    </a:ext>
-                  </a:extLst>
-                </a:gridCol>
-                <a:gridCol w="2382289">
-                  <a:extLst>
-                    <a:ext uri="{9D8B030D-6E8A-4147-A177-3AD203B41FA5}">
-                      <a16:colId xmlns:a16="http://schemas.microsoft.com/office/drawing/2014/main" val="3194293325"/>
-                    </a:ext>
-                  </a:extLst>
-                </a:gridCol>
-                <a:gridCol w="2375882">
-                  <a:extLst>
-                    <a:ext uri="{9D8B030D-6E8A-4147-A177-3AD203B41FA5}">
-                      <a16:colId xmlns:a16="http://schemas.microsoft.com/office/drawing/2014/main" val="1025652441"/>
-                    </a:ext>
-                  </a:extLst>
-                </a:gridCol>
-                <a:gridCol w="2484081">
-                  <a:extLst>
-                    <a:ext uri="{9D8B030D-6E8A-4147-A177-3AD203B41FA5}">
-                      <a16:colId xmlns:a16="http://schemas.microsoft.com/office/drawing/2014/main" val="1682647431"/>
-                    </a:ext>
-                  </a:extLst>
-                </a:gridCol>
-              </a:tblGrid>
-              <a:tr h="444797">
-                <a:tc>
-                  <a:txBody>
-                    <a:bodyPr/>
-                    <a:lstStyle/>
-                    <a:p>
-                      <a:endParaRPr lang="en-BD" sz="2000"/>
-                    </a:p>
-                  </a:txBody>
-                  <a:tcPr marL="101090" marR="101090" marT="50545" marB="50545"/>
-                </a:tc>
-                <a:tc>
-                  <a:txBody>
-                    <a:bodyPr/>
-                    <a:lstStyle/>
-                    <a:p>
-                      <a:r>
-                        <a:rPr lang="en-BD" sz="2000"/>
-                        <a:t>Canditate 1</a:t>
-                      </a:r>
-                    </a:p>
-                  </a:txBody>
-                  <a:tcPr marL="101090" marR="101090" marT="50545" marB="50545"/>
-                </a:tc>
-                <a:tc>
-                  <a:txBody>
-                    <a:bodyPr/>
-                    <a:lstStyle/>
-                    <a:p>
-                      <a:pPr marL="0" marR="0" lvl="0" indent="0" algn="l" defTabSz="457200" rtl="0" eaLnBrk="1" fontAlgn="auto" latinLnBrk="0" hangingPunct="1">
-                        <a:lnSpc>
-                          <a:spcPct val="100000"/>
-                        </a:lnSpc>
-                        <a:spcBef>
-                          <a:spcPts val="0"/>
-                        </a:spcBef>
-                        <a:spcAft>
-                          <a:spcPts val="0"/>
-                        </a:spcAft>
-                        <a:buClrTx/>
-                        <a:buSzTx/>
-                        <a:buFontTx/>
-                        <a:buNone/>
-                        <a:tabLst/>
-                        <a:defRPr/>
-                      </a:pPr>
-                      <a:r>
-                        <a:rPr lang="en-BD" sz="2000"/>
-                        <a:t>Canditate 2</a:t>
-                      </a:r>
-                    </a:p>
-                  </a:txBody>
-                  <a:tcPr marL="101090" marR="101090" marT="50545" marB="50545"/>
-                </a:tc>
-                <a:tc>
-                  <a:txBody>
-                    <a:bodyPr/>
-                    <a:lstStyle/>
-                    <a:p>
-                      <a:pPr marL="0" marR="0" lvl="0" indent="0" algn="l" defTabSz="457200" rtl="0" eaLnBrk="1" fontAlgn="auto" latinLnBrk="0" hangingPunct="1">
-                        <a:lnSpc>
-                          <a:spcPct val="100000"/>
-                        </a:lnSpc>
-                        <a:spcBef>
-                          <a:spcPts val="0"/>
-                        </a:spcBef>
-                        <a:spcAft>
-                          <a:spcPts val="0"/>
-                        </a:spcAft>
-                        <a:buClrTx/>
-                        <a:buSzTx/>
-                        <a:buFontTx/>
-                        <a:buNone/>
-                        <a:tabLst/>
-                        <a:defRPr/>
-                      </a:pPr>
-                      <a:r>
-                        <a:rPr lang="en-BD" sz="2000"/>
-                        <a:t>Canditate 3</a:t>
-                      </a:r>
-                    </a:p>
-                  </a:txBody>
-                  <a:tcPr marL="101090" marR="101090" marT="50545" marB="50545"/>
-                </a:tc>
-                <a:extLst>
-                  <a:ext uri="{0D108BD9-81ED-4DB2-BD59-A6C34878D82A}">
-                    <a16:rowId xmlns:a16="http://schemas.microsoft.com/office/drawing/2014/main" val="527192938"/>
-                  </a:ext>
-                </a:extLst>
-              </a:tr>
-              <a:tr h="444797">
-                <a:tc>
-                  <a:txBody>
-                    <a:bodyPr/>
-                    <a:lstStyle/>
-                    <a:p>
-                      <a:r>
-                        <a:rPr lang="en-BD" sz="2000"/>
-                        <a:t>Understanding</a:t>
-                      </a:r>
-                    </a:p>
-                  </a:txBody>
-                  <a:tcPr marL="101090" marR="101090" marT="50545" marB="50545"/>
-                </a:tc>
-                <a:tc>
-                  <a:txBody>
-                    <a:bodyPr/>
-                    <a:lstStyle/>
-                    <a:p>
-                      <a:r>
-                        <a:rPr lang="en-BD" sz="2000"/>
-                        <a:t>Yes</a:t>
-                      </a:r>
-                    </a:p>
-                  </a:txBody>
-                  <a:tcPr marL="101090" marR="101090" marT="50545" marB="50545"/>
-                </a:tc>
-                <a:tc>
-                  <a:txBody>
-                    <a:bodyPr/>
-                    <a:lstStyle/>
-                    <a:p>
-                      <a:r>
-                        <a:rPr lang="en-BD" sz="2000"/>
-                        <a:t>Yes</a:t>
-                      </a:r>
-                    </a:p>
-                  </a:txBody>
-                  <a:tcPr marL="101090" marR="101090" marT="50545" marB="50545"/>
-                </a:tc>
-                <a:tc>
-                  <a:txBody>
-                    <a:bodyPr/>
-                    <a:lstStyle/>
-                    <a:p>
-                      <a:r>
-                        <a:rPr lang="en-BD" sz="2000"/>
-                        <a:t>Partly</a:t>
-                      </a:r>
-                    </a:p>
-                  </a:txBody>
-                  <a:tcPr marL="101090" marR="101090" marT="50545" marB="50545"/>
-                </a:tc>
-                <a:extLst>
-                  <a:ext uri="{0D108BD9-81ED-4DB2-BD59-A6C34878D82A}">
-                    <a16:rowId xmlns:a16="http://schemas.microsoft.com/office/drawing/2014/main" val="1649843950"/>
-                  </a:ext>
-                </a:extLst>
-              </a:tr>
-              <a:tr h="444797">
-                <a:tc>
-                  <a:txBody>
-                    <a:bodyPr/>
-                    <a:lstStyle/>
-                    <a:p>
-                      <a:r>
-                        <a:rPr lang="en-BD" sz="2000"/>
-                        <a:t>Support Needed</a:t>
-                      </a:r>
-                    </a:p>
-                  </a:txBody>
-                  <a:tcPr marL="101090" marR="101090" marT="50545" marB="50545"/>
-                </a:tc>
-                <a:tc>
-                  <a:txBody>
-                    <a:bodyPr/>
-                    <a:lstStyle/>
-                    <a:p>
-                      <a:r>
-                        <a:rPr lang="en-BD" sz="2000" dirty="0"/>
-                        <a:t>No</a:t>
-                      </a:r>
-                    </a:p>
-                  </a:txBody>
-                  <a:tcPr marL="101090" marR="101090" marT="50545" marB="50545"/>
-                </a:tc>
-                <a:tc>
-                  <a:txBody>
-                    <a:bodyPr/>
-                    <a:lstStyle/>
-                    <a:p>
-                      <a:r>
-                        <a:rPr lang="en-BD" sz="2000"/>
-                        <a:t>No</a:t>
-                      </a:r>
-                    </a:p>
-                  </a:txBody>
-                  <a:tcPr marL="101090" marR="101090" marT="50545" marB="50545"/>
-                </a:tc>
-                <a:tc>
-                  <a:txBody>
-                    <a:bodyPr/>
-                    <a:lstStyle/>
-                    <a:p>
-                      <a:r>
-                        <a:rPr lang="en-BD" sz="2000"/>
-                        <a:t>Yes</a:t>
-                      </a:r>
-                    </a:p>
-                  </a:txBody>
-                  <a:tcPr marL="101090" marR="101090" marT="50545" marB="50545"/>
-                </a:tc>
-                <a:extLst>
-                  <a:ext uri="{0D108BD9-81ED-4DB2-BD59-A6C34878D82A}">
-                    <a16:rowId xmlns:a16="http://schemas.microsoft.com/office/drawing/2014/main" val="967924198"/>
-                  </a:ext>
-                </a:extLst>
-              </a:tr>
-              <a:tr h="444797">
-                <a:tc>
-                  <a:txBody>
-                    <a:bodyPr/>
-                    <a:lstStyle/>
-                    <a:p>
-                      <a:r>
-                        <a:rPr lang="en-BD" sz="2000"/>
-                        <a:t>Correct Answer</a:t>
-                      </a:r>
-                    </a:p>
-                  </a:txBody>
-                  <a:tcPr marL="101090" marR="101090" marT="50545" marB="50545"/>
-                </a:tc>
-                <a:tc>
-                  <a:txBody>
-                    <a:bodyPr/>
-                    <a:lstStyle/>
-                    <a:p>
-                      <a:r>
-                        <a:rPr lang="en-BD" sz="2000" dirty="0"/>
-                        <a:t>No</a:t>
-                      </a:r>
-                    </a:p>
-                  </a:txBody>
-                  <a:tcPr marL="101090" marR="101090" marT="50545" marB="50545"/>
-                </a:tc>
-                <a:tc>
-                  <a:txBody>
-                    <a:bodyPr/>
-                    <a:lstStyle/>
-                    <a:p>
-                      <a:r>
-                        <a:rPr lang="en-BD" sz="2000" dirty="0"/>
-                        <a:t>No</a:t>
-                      </a:r>
-                    </a:p>
-                  </a:txBody>
-                  <a:tcPr marL="101090" marR="101090" marT="50545" marB="50545"/>
-                </a:tc>
-                <a:tc>
-                  <a:txBody>
-                    <a:bodyPr/>
-                    <a:lstStyle/>
-                    <a:p>
-                      <a:r>
-                        <a:rPr lang="en-BD" sz="2000" dirty="0"/>
-                        <a:t>Yes</a:t>
-                      </a:r>
-                    </a:p>
-                  </a:txBody>
-                  <a:tcPr marL="101090" marR="101090" marT="50545" marB="50545"/>
-                </a:tc>
-                <a:extLst>
-                  <a:ext uri="{0D108BD9-81ED-4DB2-BD59-A6C34878D82A}">
-                    <a16:rowId xmlns:a16="http://schemas.microsoft.com/office/drawing/2014/main" val="1442486957"/>
-                  </a:ext>
-                </a:extLst>
-              </a:tr>
-              <a:tr h="1657879">
-                <a:tc>
-                  <a:txBody>
-                    <a:bodyPr/>
-                    <a:lstStyle/>
-                    <a:p>
-                      <a:r>
-                        <a:rPr lang="en-BD" sz="2000"/>
-                        <a:t>Feedback</a:t>
-                      </a:r>
-                    </a:p>
-                  </a:txBody>
-                  <a:tcPr marL="101090" marR="101090" marT="50545" marB="50545"/>
-                </a:tc>
-                <a:tc>
-                  <a:txBody>
-                    <a:bodyPr/>
-                    <a:lstStyle/>
-                    <a:p>
-                      <a:r>
-                        <a:rPr lang="en-GB" sz="2000" dirty="0"/>
-                        <a:t>Finding South Africa now was easy after having done Q3; ranked bar chart is obvious.</a:t>
-                      </a:r>
-                      <a:endParaRPr lang="en-BD" sz="2000" dirty="0"/>
-                    </a:p>
-                  </a:txBody>
-                  <a:tcPr marL="101090" marR="101090" marT="50545" marB="50545"/>
-                </a:tc>
-                <a:tc>
-                  <a:txBody>
-                    <a:bodyPr/>
-                    <a:lstStyle/>
-                    <a:p>
-                      <a:r>
-                        <a:rPr lang="en-BD" sz="2000" dirty="0"/>
-                        <a:t>No feedback provided</a:t>
-                      </a:r>
-                    </a:p>
-                  </a:txBody>
-                  <a:tcPr marL="101090" marR="101090" marT="50545" marB="50545"/>
-                </a:tc>
-                <a:tc>
-                  <a:txBody>
-                    <a:bodyPr/>
-                    <a:lstStyle/>
-                    <a:p>
-                      <a:r>
-                        <a:rPr lang="en-GB" sz="2000" dirty="0"/>
-                        <a:t>Selecting country directly would be helpful.</a:t>
-                      </a:r>
-                      <a:endParaRPr lang="en-BD" sz="2000" dirty="0"/>
-                    </a:p>
-                  </a:txBody>
-                  <a:tcPr marL="101090" marR="101090" marT="50545" marB="50545"/>
-                </a:tc>
-                <a:extLst>
-                  <a:ext uri="{0D108BD9-81ED-4DB2-BD59-A6C34878D82A}">
-                    <a16:rowId xmlns:a16="http://schemas.microsoft.com/office/drawing/2014/main" val="2529668582"/>
-                  </a:ext>
-                </a:extLst>
-              </a:tr>
-            </a:tbl>
-          </a:graphicData>
-        </a:graphic>
-      </p:graphicFrame>
-      <p:sp>
-        <p:nvSpPr>
-          <p:cNvPr id="9" name="Rounded Rectangle 8"/>
-          <p:cNvSpPr/>
-          <p:nvPr/>
-        </p:nvSpPr>
-        <p:spPr>
-          <a:xfrm>
-            <a:off x="1192306" y="2967318"/>
-            <a:ext cx="2770094" cy="1685364"/>
-          </a:xfrm>
-          <a:prstGeom prst="roundRect">
-            <a:avLst/>
-          </a:prstGeom>
-          <a:solidFill>
-            <a:schemeClr val="accent4"/>
-          </a:solidFill>
-          <a:ln>
-            <a:noFill/>
-          </a:ln>
-        </p:spPr>
-        <p:style>
-          <a:lnRef idx="0">
-            <a:scrgbClr r="0" g="0" b="0"/>
-          </a:lnRef>
-          <a:fillRef idx="0">
-            <a:scrgbClr r="0" g="0" b="0"/>
-          </a:fillRef>
-          <a:effectRef idx="0">
-            <a:scrgbClr r="0" g="0" b="0"/>
-          </a:effectRef>
-          <a:fontRef idx="minor">
-            <a:schemeClr val="lt1"/>
-          </a:fontRef>
-        </p:style>
-        <p:txBody>
-          <a:bodyPr rtlCol="0" anchor="ctr"/>
-          <a:lstStyle/>
-          <a:p>
-            <a:pPr algn="ctr"/>
-            <a:r>
-              <a:rPr lang="en-BE" dirty="0" smtClean="0"/>
-              <a:t>remove</a:t>
-            </a:r>
-            <a:endParaRPr lang="nl-BE" dirty="0"/>
-          </a:p>
-        </p:txBody>
-      </p:sp>
-    </p:spTree>
-    <p:extLst>
-      <p:ext uri="{BB962C8B-B14F-4D97-AF65-F5344CB8AC3E}">
-        <p14:creationId xmlns:p14="http://schemas.microsoft.com/office/powerpoint/2010/main" val="1314898350"/>
-      </p:ext>
-    </p:extLst>
-  </p:cSld>
-  <p:clrMapOvr>
-    <a:masterClrMapping/>
-  </p:clrMapOvr>
-  <mc:AlternateContent xmlns:mc="http://schemas.openxmlformats.org/markup-compatibility/2006" xmlns:p14="http://schemas.microsoft.com/office/powerpoint/2010/main">
-    <mc:Choice Requires="p14">
-      <p:transition spd="slow" p14:dur="2000"/>
-    </mc:Choice>
-    <mc:Fallback xmlns="">
-      <p:transition spd="slow"/>
-    </mc:Fallback>
-  </mc:AlternateContent>
-  <p:timing>
-    <p:tnLst>
-      <p:par>
-        <p:cTn id="1" dur="indefinite" restart="never" nodeType="tmRoot"/>
-      </p:par>
-    </p:tnLst>
-  </p:timing>
-</p:sld>
-</file>
-
-<file path=ppt/slides/slide12.xml><?xml version="1.0" encoding="utf-8"?>
-<p:sld xmlns:a="http://schemas.openxmlformats.org/drawingml/2006/main" xmlns:r="http://schemas.openxmlformats.org/officeDocument/2006/relationships" xmlns:p="http://schemas.openxmlformats.org/presentationml/2006/main">
-  <p:cSld>
-    <p:spTree>
-      <p:nvGrpSpPr>
-        <p:cNvPr id="1" name=""/>
-        <p:cNvGrpSpPr/>
-        <p:nvPr/>
-      </p:nvGrpSpPr>
-      <p:grpSpPr>
-        <a:xfrm>
-          <a:off x="0" y="0"/>
-          <a:ext cx="0" cy="0"/>
-          <a:chOff x="0" y="0"/>
-          <a:chExt cx="0" cy="0"/>
-        </a:xfrm>
-      </p:grpSpPr>
-      <p:sp>
-        <p:nvSpPr>
-          <p:cNvPr id="2" name="Title 1"/>
-          <p:cNvSpPr>
-            <a:spLocks noGrp="1"/>
-          </p:cNvSpPr>
-          <p:nvPr>
-            <p:ph type="title"/>
-          </p:nvPr>
-        </p:nvSpPr>
-        <p:spPr/>
-        <p:txBody>
-          <a:bodyPr/>
-          <a:lstStyle/>
-          <a:p>
-            <a:r>
-              <a:rPr lang="en-BE" dirty="0"/>
-              <a:t>Evaluation takeaways</a:t>
-            </a:r>
-            <a:endParaRPr lang="nl-BE" dirty="0"/>
-          </a:p>
-        </p:txBody>
-      </p:sp>
-      <p:sp>
-        <p:nvSpPr>
-          <p:cNvPr id="3" name="Content Placeholder 2"/>
-          <p:cNvSpPr>
-            <a:spLocks noGrp="1"/>
-          </p:cNvSpPr>
-          <p:nvPr>
-            <p:ph idx="1"/>
-          </p:nvPr>
-        </p:nvSpPr>
-        <p:spPr>
-          <a:xfrm>
-            <a:off x="677334" y="1930401"/>
-            <a:ext cx="8596668" cy="4110962"/>
-          </a:xfrm>
-        </p:spPr>
-        <p:txBody>
-          <a:bodyPr>
-            <a:normAutofit lnSpcReduction="10000"/>
-          </a:bodyPr>
-          <a:lstStyle/>
-          <a:p>
-            <a:pPr marL="0" indent="0">
-              <a:buNone/>
-            </a:pPr>
-            <a:r>
-              <a:rPr lang="en-BE" b="1" dirty="0" smtClean="0"/>
-              <a:t>Positive</a:t>
-            </a:r>
-            <a:r>
-              <a:rPr lang="en-BE" dirty="0" smtClean="0"/>
-              <a:t> feedback received:</a:t>
-            </a:r>
-          </a:p>
-          <a:p>
-            <a:r>
-              <a:rPr lang="en-BE" dirty="0" smtClean="0"/>
-              <a:t>Easy on the eyes</a:t>
-            </a:r>
-          </a:p>
-          <a:p>
-            <a:r>
-              <a:rPr lang="en-BE" dirty="0" smtClean="0"/>
-              <a:t>Intuitive F-shape layout</a:t>
-            </a:r>
-          </a:p>
-          <a:p>
-            <a:r>
-              <a:rPr lang="en-BE" dirty="0" smtClean="0"/>
-              <a:t>Colour channel consistency for status was highly appreciated</a:t>
-            </a:r>
-          </a:p>
-          <a:p>
-            <a:r>
-              <a:rPr lang="en-BE" dirty="0" smtClean="0"/>
-              <a:t>BAN’s are very usefull to extract the totals</a:t>
-            </a:r>
-          </a:p>
-          <a:p>
-            <a:pPr marL="0" indent="0">
-              <a:buNone/>
-            </a:pPr>
-            <a:endParaRPr lang="en-BE" dirty="0"/>
-          </a:p>
-          <a:p>
-            <a:pPr marL="0" indent="0">
-              <a:buNone/>
-            </a:pPr>
-            <a:r>
-              <a:rPr lang="en-BE" b="1" dirty="0" smtClean="0"/>
-              <a:t>Constructive</a:t>
-            </a:r>
-            <a:r>
-              <a:rPr lang="en-BE" dirty="0" smtClean="0"/>
-              <a:t> feedback received is usefull for future iterations of the product:</a:t>
-            </a:r>
-          </a:p>
-          <a:p>
-            <a:r>
-              <a:rPr lang="en-BE" dirty="0" smtClean="0"/>
-              <a:t>Having empty filters when parent levels are not set is confusing to users</a:t>
-            </a:r>
-          </a:p>
-          <a:p>
-            <a:r>
-              <a:rPr lang="en-BE" dirty="0" smtClean="0"/>
-              <a:t>The slider could use a tooltip so users know what exactly is being filtered on</a:t>
-            </a:r>
-          </a:p>
-          <a:p>
-            <a:r>
-              <a:rPr lang="en-BE" dirty="0" smtClean="0"/>
-              <a:t>Users should know what time the data was ‘snapshotted’ to properly understand when a unit is in ‘future’ state</a:t>
-            </a:r>
-          </a:p>
-          <a:p>
-            <a:endParaRPr lang="nl-BE" dirty="0"/>
-          </a:p>
-        </p:txBody>
-      </p:sp>
-      <p:pic>
-        <p:nvPicPr>
-          <p:cNvPr id="1026" name="Picture 2" descr="Key Takeaway Speech Bubble Icon Stock Illustration - Download Image Now -  Key, Take Out Food, Icon Symbol - iStock"/>
-          <p:cNvPicPr>
-            <a:picLocks noChangeAspect="1" noChangeArrowheads="1"/>
-          </p:cNvPicPr>
-          <p:nvPr/>
-        </p:nvPicPr>
-        <p:blipFill rotWithShape="1">
-          <a:blip r:embed="rId3" cstate="print">
-            <a:duotone>
-              <a:schemeClr val="accent2">
-                <a:shade val="45000"/>
-                <a:satMod val="135000"/>
-              </a:schemeClr>
-              <a:prstClr val="white"/>
-            </a:duotone>
-            <a:extLst>
-              <a:ext uri="{28A0092B-C50C-407E-A947-70E740481C1C}">
-                <a14:useLocalDpi xmlns:a14="http://schemas.microsoft.com/office/drawing/2010/main" val="0"/>
-              </a:ext>
-            </a:extLst>
-          </a:blip>
-          <a:srcRect l="20838" t="25645" r="13996" b="23185"/>
-          <a:stretch/>
-        </p:blipFill>
-        <p:spPr bwMode="auto">
-          <a:xfrm>
-            <a:off x="6373905" y="379411"/>
-            <a:ext cx="1335742" cy="1048872"/>
-          </a:xfrm>
-          <a:prstGeom prst="rect">
-            <a:avLst/>
-          </a:prstGeom>
-          <a:noFill/>
-          <a:extLst>
-            <a:ext uri="{909E8E84-426E-40DD-AFC4-6F175D3DCCD1}">
-              <a14:hiddenFill xmlns:a14="http://schemas.microsoft.com/office/drawing/2010/main">
-                <a:solidFill>
-                  <a:srgbClr val="FFFFFF"/>
-                </a:solidFill>
-              </a14:hiddenFill>
-            </a:ext>
-          </a:extLst>
-        </p:spPr>
-      </p:pic>
-    </p:spTree>
-    <p:extLst>
-      <p:ext uri="{BB962C8B-B14F-4D97-AF65-F5344CB8AC3E}">
-        <p14:creationId xmlns:p14="http://schemas.microsoft.com/office/powerpoint/2010/main" val="83100769"/>
-      </p:ext>
-    </p:extLst>
-  </p:cSld>
-  <p:clrMapOvr>
-    <a:masterClrMapping/>
-  </p:clrMapOvr>
-  <p:timing>
-    <p:tnLst>
-      <p:par>
-        <p:cTn id="1" dur="indefinite" restart="never" nodeType="tmRoot"/>
-      </p:par>
-    </p:tnLst>
-  </p:timing>
-</p:sld>
-</file>
-
-<file path=ppt/slides/slide13.xml><?xml version="1.0" encoding="utf-8"?>
-<p:sld xmlns:a="http://schemas.openxmlformats.org/drawingml/2006/main" xmlns:r="http://schemas.openxmlformats.org/officeDocument/2006/relationships" xmlns:p="http://schemas.openxmlformats.org/presentationml/2006/main">
-  <p:cSld>
-    <p:spTree>
-      <p:nvGrpSpPr>
-        <p:cNvPr id="1" name=""/>
-        <p:cNvGrpSpPr/>
-        <p:nvPr/>
-      </p:nvGrpSpPr>
-      <p:grpSpPr>
-        <a:xfrm>
-          <a:off x="0" y="0"/>
-          <a:ext cx="0" cy="0"/>
-          <a:chOff x="0" y="0"/>
-          <a:chExt cx="0" cy="0"/>
-        </a:xfrm>
-      </p:grpSpPr>
-      <p:sp>
-        <p:nvSpPr>
-          <p:cNvPr id="4" name="Title 3"/>
-          <p:cNvSpPr>
-            <a:spLocks noGrp="1"/>
-          </p:cNvSpPr>
-          <p:nvPr>
-            <p:ph type="ctrTitle"/>
-          </p:nvPr>
-        </p:nvSpPr>
-        <p:spPr/>
-        <p:txBody>
-          <a:bodyPr/>
-          <a:lstStyle/>
-          <a:p>
-            <a:r>
-              <a:rPr lang="en-BE" dirty="0" smtClean="0"/>
-              <a:t>Time for questions!</a:t>
-            </a:r>
-            <a:endParaRPr lang="nl-BE" dirty="0"/>
-          </a:p>
-        </p:txBody>
-      </p:sp>
-    </p:spTree>
-    <p:extLst>
-      <p:ext uri="{BB962C8B-B14F-4D97-AF65-F5344CB8AC3E}">
-        <p14:creationId xmlns:p14="http://schemas.microsoft.com/office/powerpoint/2010/main" val="193048007"/>
-      </p:ext>
-    </p:extLst>
-  </p:cSld>
-  <p:clrMapOvr>
-    <a:masterClrMapping/>
-  </p:clrMapOvr>
-  <p:timing>
-    <p:tnLst>
-      <p:par>
-        <p:cTn id="1" dur="indefinite" restart="never" nodeType="tmRoot"/>
-      </p:par>
-    </p:tnLst>
-  </p:timing>
 </p:sld>
 </file>
 
@@ -16555,13 +14562,6 @@
   <p:clrMapOvr>
     <a:masterClrMapping/>
   </p:clrMapOvr>
-  <p:timing>
-    <p:tnLst>
-      <p:par>
-        <p:cTn id="1" dur="indefinite" restart="never" nodeType="tmRoot"/>
-      </p:par>
-    </p:tnLst>
-  </p:timing>
 </p:sld>
 </file>
 
@@ -16633,13 +14633,8 @@
             </a:pPr>
             <a:r>
               <a:rPr lang="en-BE" dirty="0"/>
-              <a:t>These are the selected target tasks that can be solved with our current </a:t>
-            </a:r>
-            <a:r>
-              <a:rPr lang="en-BE" dirty="0" smtClean="0"/>
-              <a:t>app:</a:t>
-            </a:r>
-            <a:endParaRPr lang="en-BE" dirty="0"/>
+              <a:t>These are the selected target tasks that can be solved with our current app:</a:t>
+            </a:r>
           </a:p>
           <a:p>
             <a:pPr lvl="0">
@@ -16681,15 +14676,7 @@
             </a:pPr>
             <a:r>
               <a:rPr lang="en-BE" dirty="0"/>
-              <a:t>Can you locate the 3rd largest </a:t>
-            </a:r>
-            <a:r>
-              <a:rPr lang="en-BE" dirty="0" smtClean="0"/>
-              <a:t>operating onshore </a:t>
-            </a:r>
-            <a:r>
-              <a:rPr lang="en-BE" dirty="0"/>
-              <a:t>wind farm in South Africa and retrieve its capacity value?</a:t>
+              <a:t>Can you locate the 3rd largest operating onshore wind farm in South Africa and retrieve its capacity value?</a:t>
             </a:r>
             <a:endParaRPr lang="nl-BE" dirty="0"/>
           </a:p>
@@ -16741,7 +14728,7 @@
           <a:p>
             <a:pPr algn="ctr"/>
             <a:r>
-              <a:rPr lang="en-BE" dirty="0" smtClean="0"/>
+              <a:rPr lang="en-BE" dirty="0"/>
               <a:t>video</a:t>
             </a:r>
             <a:endParaRPr lang="nl-BE" dirty="0"/>
@@ -16905,7 +14892,7 @@
           <a:p>
             <a:pPr algn="ctr"/>
             <a:r>
-              <a:rPr lang="en-BE" dirty="0" smtClean="0"/>
+              <a:rPr lang="en-BE" dirty="0"/>
               <a:t>video</a:t>
             </a:r>
             <a:endParaRPr lang="nl-BE" dirty="0"/>
@@ -16922,13 +14909,6 @@
   <p:clrMapOvr>
     <a:masterClrMapping/>
   </p:clrMapOvr>
-  <p:timing>
-    <p:tnLst>
-      <p:par>
-        <p:cTn id="1" dur="indefinite" restart="never" nodeType="tmRoot"/>
-      </p:par>
-    </p:tnLst>
-  </p:timing>
 </p:sld>
 </file>
 
@@ -17031,17 +15011,12 @@
           <a:p>
             <a:r>
               <a:rPr lang="en-BE" dirty="0"/>
-              <a:t>Elaboration of the static prototype into </a:t>
-            </a:r>
-            <a:r>
-              <a:rPr lang="en-BE" dirty="0" smtClean="0"/>
-              <a:t>an interactive visualization </a:t>
-            </a:r>
-            <a:r>
-              <a:rPr lang="en-BE" i="1" dirty="0" smtClean="0"/>
+              <a:t>Elaboration of the static prototype into an interactive visualization </a:t>
+            </a:r>
+            <a:r>
+              <a:rPr lang="en-BE" i="1" dirty="0"/>
               <a:t>(cfr. demo)</a:t>
             </a:r>
-            <a:endParaRPr lang="en-BE" i="1" dirty="0"/>
           </a:p>
           <a:p>
             <a:pPr lvl="1"/>
@@ -17073,14 +15048,13 @@
           </a:p>
           <a:p>
             <a:r>
-              <a:rPr lang="en-BE" dirty="0" smtClean="0"/>
+              <a:rPr lang="en-BE" dirty="0"/>
               <a:t>Evaluation </a:t>
             </a:r>
             <a:r>
-              <a:rPr lang="en-BE" i="1" dirty="0" smtClean="0"/>
+              <a:rPr lang="en-BE" i="1" dirty="0"/>
               <a:t>(cfr. final part of this presentation)</a:t>
             </a:r>
-            <a:endParaRPr lang="en-BE" i="1" dirty="0"/>
           </a:p>
           <a:p>
             <a:pPr lvl="1"/>
@@ -17161,13 +15135,6 @@
   <p:clrMapOvr>
     <a:masterClrMapping/>
   </p:clrMapOvr>
-  <p:timing>
-    <p:tnLst>
-      <p:par>
-        <p:cTn id="1" dur="indefinite" restart="never" nodeType="tmRoot"/>
-      </p:par>
-    </p:tnLst>
-  </p:timing>
 </p:sld>
 </file>
 
@@ -17240,13 +15207,6 @@
   <p:clrMapOvr>
     <a:masterClrMapping/>
   </p:clrMapOvr>
-  <p:timing>
-    <p:tnLst>
-      <p:par>
-        <p:cTn id="1" dur="indefinite" restart="never" nodeType="tmRoot"/>
-      </p:par>
-    </p:tnLst>
-  </p:timing>
 </p:sld>
 </file>
 
@@ -17331,7 +15291,7 @@
                 <a14:useLocalDpi xmlns:a14="http://schemas.microsoft.com/office/drawing/2010/main" val="0"/>
               </a:ext>
               <a:ext uri="{96DAC541-7B7A-43D3-8B79-37D633B846F1}">
-                <asvg:svgBlip xmlns:asvg="http://schemas.microsoft.com/office/drawing/2016/SVG/main" xmlns="" r:embed="rId3"/>
+                <asvg:svgBlip xmlns:asvg="http://schemas.microsoft.com/office/drawing/2016/SVG/main" r:embed="rId3"/>
               </a:ext>
             </a:extLst>
           </a:blip>
@@ -17447,22 +15407,14 @@
             </a:br>
             <a:r>
               <a:rPr lang="en-BD" sz="1700" dirty="0"/>
-              <a:t>2. </a:t>
-            </a:r>
-            <a:r>
-              <a:rPr lang="en-BD" sz="1700" dirty="0" smtClean="0"/>
-              <a:t>Answering the question without support</a:t>
+              <a:t>2. Answering the question without support</a:t>
             </a:r>
             <a:br>
-              <a:rPr lang="en-BD" sz="1700" dirty="0" smtClean="0"/>
+              <a:rPr lang="en-BD" sz="1700" dirty="0"/>
             </a:br>
             <a:r>
-              <a:rPr lang="en-BD" sz="1700" dirty="0" smtClean="0"/>
-              <a:t>3</a:t>
-            </a:r>
-            <a:r>
               <a:rPr lang="en-BD" sz="1700" dirty="0"/>
-              <a:t>. Correctness of the answers</a:t>
+              <a:t>3. Correctness of the answers</a:t>
             </a:r>
             <a:br>
               <a:rPr lang="en-BD" sz="1700" dirty="0"/>
@@ -17941,13 +15893,6 @@
   <p:clrMapOvr>
     <a:masterClrMapping/>
   </p:clrMapOvr>
-  <p:timing>
-    <p:tnLst>
-      <p:par>
-        <p:cTn id="1" dur="indefinite" restart="never" nodeType="tmRoot"/>
-      </p:par>
-    </p:tnLst>
-  </p:timing>
 </p:sld>
 </file>
 
@@ -17984,7 +15929,7 @@
           <a:lstStyle/>
           <a:p>
             <a:r>
-              <a:rPr lang="en-BE" dirty="0" smtClean="0"/>
+              <a:rPr lang="en-BE" dirty="0"/>
               <a:t>Answers summary</a:t>
             </a:r>
             <a:endParaRPr lang="nl-BE" dirty="0"/>
@@ -18015,8 +15960,8 @@
         </p:blipFill>
         <p:spPr>
           <a:xfrm>
-            <a:off x="5895291" y="609600"/>
-            <a:ext cx="702733" cy="685867"/>
+            <a:off x="10436399" y="5161993"/>
+            <a:ext cx="1706390" cy="1665436"/>
           </a:xfrm>
           <a:prstGeom prst="rect">
             <a:avLst/>
@@ -18025,87 +15970,40 @@
       </p:pic>
       <p:pic>
         <p:nvPicPr>
-          <p:cNvPr id="6" name="Picture 5"/>
+          <p:cNvPr id="5" name="Picture 4" descr="A graph with multiple colored bars&#10;&#10;Description automatically generated with medium confidence">
+            <a:extLst>
+              <a:ext uri="{FF2B5EF4-FFF2-40B4-BE49-F238E27FC236}">
+                <a16:creationId xmlns:a16="http://schemas.microsoft.com/office/drawing/2014/main" id="{7F5DD870-9F21-AA1A-C34A-72CA914F5AA1}"/>
+              </a:ext>
+            </a:extLst>
+          </p:cNvPr>
           <p:cNvPicPr>
             <a:picLocks noChangeAspect="1"/>
           </p:cNvPicPr>
           <p:nvPr/>
         </p:nvPicPr>
         <p:blipFill>
-          <a:blip r:embed="rId3"/>
+          <a:blip r:embed="rId3">
+            <a:extLst>
+              <a:ext uri="{28A0092B-C50C-407E-A947-70E740481C1C}">
+                <a14:useLocalDpi xmlns:a14="http://schemas.microsoft.com/office/drawing/2010/main" val="0"/>
+              </a:ext>
+            </a:extLst>
+          </a:blip>
           <a:stretch>
             <a:fillRect/>
           </a:stretch>
         </p:blipFill>
         <p:spPr>
           <a:xfrm>
-            <a:off x="1860618" y="1930400"/>
-            <a:ext cx="7314772" cy="4244740"/>
+            <a:off x="1755602" y="1500266"/>
+            <a:ext cx="7518400" cy="5029200"/>
           </a:xfrm>
           <a:prstGeom prst="rect">
             <a:avLst/>
           </a:prstGeom>
         </p:spPr>
       </p:pic>
-      <p:sp>
-        <p:nvSpPr>
-          <p:cNvPr id="7" name="Rounded Rectangle 6"/>
-          <p:cNvSpPr/>
-          <p:nvPr/>
-        </p:nvSpPr>
-        <p:spPr>
-          <a:xfrm>
-            <a:off x="1192306" y="2967318"/>
-            <a:ext cx="2770094" cy="1685364"/>
-          </a:xfrm>
-          <a:prstGeom prst="roundRect">
-            <a:avLst/>
-          </a:prstGeom>
-          <a:solidFill>
-            <a:schemeClr val="accent4"/>
-          </a:solidFill>
-          <a:ln>
-            <a:noFill/>
-          </a:ln>
-        </p:spPr>
-        <p:style>
-          <a:lnRef idx="0">
-            <a:scrgbClr r="0" g="0" b="0"/>
-          </a:lnRef>
-          <a:fillRef idx="0">
-            <a:scrgbClr r="0" g="0" b="0"/>
-          </a:fillRef>
-          <a:effectRef idx="0">
-            <a:scrgbClr r="0" g="0" b="0"/>
-          </a:effectRef>
-          <a:fontRef idx="minor">
-            <a:schemeClr val="lt1"/>
-          </a:fontRef>
-        </p:style>
-        <p:txBody>
-          <a:bodyPr rtlCol="0" anchor="ctr"/>
-          <a:lstStyle/>
-          <a:p>
-            <a:pPr algn="ctr"/>
-            <a:r>
-              <a:rPr lang="en-BE" dirty="0" smtClean="0"/>
-              <a:t>PROPOSAL viz</a:t>
-            </a:r>
-          </a:p>
-          <a:p>
-            <a:pPr algn="ctr"/>
-            <a:endParaRPr lang="en-BE" dirty="0"/>
-          </a:p>
-          <a:p>
-            <a:pPr algn="ctr"/>
-            <a:r>
-              <a:rPr lang="en-BE" dirty="0" smtClean="0"/>
-              <a:t>TASK: answer: was the interview well designed? </a:t>
-            </a:r>
-            <a:endParaRPr lang="nl-BE" dirty="0"/>
-          </a:p>
-        </p:txBody>
-      </p:sp>
     </p:spTree>
     <p:extLst>
       <p:ext uri="{BB962C8B-B14F-4D97-AF65-F5344CB8AC3E}">
@@ -18116,747 +16014,11 @@
   <p:clrMapOvr>
     <a:masterClrMapping/>
   </p:clrMapOvr>
-  <p:timing>
-    <p:tnLst>
-      <p:par>
-        <p:cTn id="1" dur="indefinite" restart="never" nodeType="tmRoot"/>
-      </p:par>
-    </p:tnLst>
-  </p:timing>
 </p:sld>
 </file>
 
 <file path=ppt/slides/slide8.xml><?xml version="1.0" encoding="utf-8"?>
-<p:sld xmlns:a="http://schemas.openxmlformats.org/drawingml/2006/main" xmlns:r="http://schemas.openxmlformats.org/officeDocument/2006/relationships" xmlns:p="http://schemas.openxmlformats.org/presentationml/2006/main" show="0">
-  <p:cSld>
-    <p:bg>
-      <p:bgPr>
-        <a:solidFill>
-          <a:schemeClr val="bg1"/>
-        </a:solidFill>
-        <a:effectLst/>
-      </p:bgPr>
-    </p:bg>
-    <p:spTree>
-      <p:nvGrpSpPr>
-        <p:cNvPr id="1" name=""/>
-        <p:cNvGrpSpPr/>
-        <p:nvPr/>
-      </p:nvGrpSpPr>
-      <p:grpSpPr>
-        <a:xfrm>
-          <a:off x="0" y="0"/>
-          <a:ext cx="0" cy="0"/>
-          <a:chOff x="0" y="0"/>
-          <a:chExt cx="0" cy="0"/>
-        </a:xfrm>
-      </p:grpSpPr>
-      <p:sp useBgFill="1">
-        <p:nvSpPr>
-          <p:cNvPr id="9" name="Rectangle 8">
-            <a:extLst>
-              <a:ext uri="{FF2B5EF4-FFF2-40B4-BE49-F238E27FC236}">
-                <a16:creationId xmlns:a16="http://schemas.microsoft.com/office/drawing/2014/main" id="{45B71F80-1F92-4074-84D9-16A062B215B3}"/>
-              </a:ext>
-              <a:ext uri="{C183D7F6-B498-43B3-948B-1728B52AA6E4}">
-                <adec:decorative xmlns:adec="http://schemas.microsoft.com/office/drawing/2017/decorative" xmlns="" val="1"/>
-              </a:ext>
-            </a:extLst>
-          </p:cNvPr>
-          <p:cNvSpPr>
-            <a:spLocks noGrp="1" noRot="1" noChangeAspect="1" noMove="1" noResize="1" noEditPoints="1" noAdjustHandles="1" noChangeArrowheads="1" noChangeShapeType="1" noTextEdit="1"/>
-          </p:cNvSpPr>
-          <p:nvPr>
-            <p:extLst>
-              <p:ext uri="{386F3935-93C4-4BCD-93E2-E3B085C9AB24}">
-                <p16:designElem xmlns:p16="http://schemas.microsoft.com/office/powerpoint/2015/main" val="1"/>
-              </p:ext>
-            </p:extLst>
-          </p:nvPr>
-        </p:nvSpPr>
-        <p:spPr>
-          <a:xfrm>
-            <a:off x="0" y="0"/>
-            <a:ext cx="12192000" cy="6858000"/>
-          </a:xfrm>
-          <a:prstGeom prst="rect">
-            <a:avLst/>
-          </a:prstGeom>
-          <a:ln>
-            <a:noFill/>
-          </a:ln>
-        </p:spPr>
-        <p:style>
-          <a:lnRef idx="2">
-            <a:schemeClr val="accent1">
-              <a:shade val="50000"/>
-            </a:schemeClr>
-          </a:lnRef>
-          <a:fillRef idx="1">
-            <a:schemeClr val="accent1"/>
-          </a:fillRef>
-          <a:effectRef idx="0">
-            <a:schemeClr val="accent1"/>
-          </a:effectRef>
-          <a:fontRef idx="minor">
-            <a:schemeClr val="lt1"/>
-          </a:fontRef>
-        </p:style>
-        <p:txBody>
-          <a:bodyPr rtlCol="0" anchor="ctr"/>
-          <a:lstStyle/>
-          <a:p>
-            <a:pPr algn="ctr"/>
-            <a:endParaRPr lang="en-US"/>
-          </a:p>
-        </p:txBody>
-      </p:sp>
-      <p:sp>
-        <p:nvSpPr>
-          <p:cNvPr id="2" name="Title 1">
-            <a:extLst>
-              <a:ext uri="{FF2B5EF4-FFF2-40B4-BE49-F238E27FC236}">
-                <a16:creationId xmlns:a16="http://schemas.microsoft.com/office/drawing/2014/main" id="{8273EBBC-25B7-2BD3-EA3E-0FC107DDCA6D}"/>
-              </a:ext>
-            </a:extLst>
-          </p:cNvPr>
-          <p:cNvSpPr>
-            <a:spLocks noGrp="1"/>
-          </p:cNvSpPr>
-          <p:nvPr>
-            <p:ph type="title"/>
-          </p:nvPr>
-        </p:nvSpPr>
-        <p:spPr>
-          <a:xfrm>
-            <a:off x="1286933" y="609600"/>
-            <a:ext cx="10197494" cy="1099457"/>
-          </a:xfrm>
-        </p:spPr>
-        <p:txBody>
-          <a:bodyPr>
-            <a:normAutofit/>
-          </a:bodyPr>
-          <a:lstStyle/>
-          <a:p>
-            <a:pPr>
-              <a:lnSpc>
-                <a:spcPct val="90000"/>
-              </a:lnSpc>
-            </a:pPr>
-            <a:r>
-              <a:rPr lang="en-BD" dirty="0"/>
-              <a:t>Question 1: </a:t>
-            </a:r>
-            <a:r>
-              <a:rPr lang="en-GB" dirty="0"/>
-              <a:t>How is offshore wind currently distributed across different continents?</a:t>
-            </a:r>
-            <a:endParaRPr lang="en-BD"/>
-          </a:p>
-        </p:txBody>
-      </p:sp>
-      <p:sp>
-        <p:nvSpPr>
-          <p:cNvPr id="11" name="Isosceles Triangle 10">
-            <a:extLst>
-              <a:ext uri="{FF2B5EF4-FFF2-40B4-BE49-F238E27FC236}">
-                <a16:creationId xmlns:a16="http://schemas.microsoft.com/office/drawing/2014/main" id="{7209C9DA-6E0D-46D9-8275-C52222D8CCAC}"/>
-              </a:ext>
-              <a:ext uri="{C183D7F6-B498-43B3-948B-1728B52AA6E4}">
-                <adec:decorative xmlns:adec="http://schemas.microsoft.com/office/drawing/2017/decorative" xmlns="" val="1"/>
-              </a:ext>
-            </a:extLst>
-          </p:cNvPr>
-          <p:cNvSpPr>
-            <a:spLocks noGrp="1" noRot="1" noChangeAspect="1" noMove="1" noResize="1" noEditPoints="1" noAdjustHandles="1" noChangeArrowheads="1" noChangeShapeType="1" noTextEdit="1"/>
-          </p:cNvSpPr>
-          <p:nvPr>
-            <p:extLst>
-              <p:ext uri="{386F3935-93C4-4BCD-93E2-E3B085C9AB24}">
-                <p16:designElem xmlns:p16="http://schemas.microsoft.com/office/powerpoint/2015/main" val="1"/>
-              </p:ext>
-            </p:extLst>
-          </p:nvPr>
-        </p:nvSpPr>
-        <p:spPr>
-          <a:xfrm rot="10800000">
-            <a:off x="0" y="0"/>
-            <a:ext cx="842596" cy="5666154"/>
-          </a:xfrm>
-          <a:prstGeom prst="triangle">
-            <a:avLst>
-              <a:gd name="adj" fmla="val 100000"/>
-            </a:avLst>
-          </a:prstGeom>
-          <a:solidFill>
-            <a:schemeClr val="accent1">
-              <a:alpha val="85000"/>
-            </a:schemeClr>
-          </a:solidFill>
-          <a:ln>
-            <a:noFill/>
-          </a:ln>
-          <a:effectLst/>
-        </p:spPr>
-        <p:style>
-          <a:lnRef idx="1">
-            <a:schemeClr val="accent1"/>
-          </a:lnRef>
-          <a:fillRef idx="3">
-            <a:schemeClr val="accent1"/>
-          </a:fillRef>
-          <a:effectRef idx="2">
-            <a:schemeClr val="accent1"/>
-          </a:effectRef>
-          <a:fontRef idx="minor">
-            <a:schemeClr val="lt1"/>
-          </a:fontRef>
-        </p:style>
-        <p:txBody>
-          <a:bodyPr/>
-          <a:lstStyle/>
-          <a:p>
-            <a:endParaRPr lang="en-BD"/>
-          </a:p>
-        </p:txBody>
-      </p:sp>
-      <p:sp>
-        <p:nvSpPr>
-          <p:cNvPr id="13" name="Isosceles Triangle 12">
-            <a:extLst>
-              <a:ext uri="{FF2B5EF4-FFF2-40B4-BE49-F238E27FC236}">
-                <a16:creationId xmlns:a16="http://schemas.microsoft.com/office/drawing/2014/main" id="{3EB57A4D-E0D0-46DA-B339-F24CA46FA70B}"/>
-              </a:ext>
-              <a:ext uri="{C183D7F6-B498-43B3-948B-1728B52AA6E4}">
-                <adec:decorative xmlns:adec="http://schemas.microsoft.com/office/drawing/2017/decorative" xmlns="" val="1"/>
-              </a:ext>
-            </a:extLst>
-          </p:cNvPr>
-          <p:cNvSpPr>
-            <a:spLocks noGrp="1" noRot="1" noChangeAspect="1" noMove="1" noResize="1" noEditPoints="1" noAdjustHandles="1" noChangeArrowheads="1" noChangeShapeType="1" noTextEdit="1"/>
-          </p:cNvSpPr>
-          <p:nvPr>
-            <p:extLst>
-              <p:ext uri="{386F3935-93C4-4BCD-93E2-E3B085C9AB24}">
-                <p16:designElem xmlns:p16="http://schemas.microsoft.com/office/powerpoint/2015/main" val="1"/>
-              </p:ext>
-            </p:extLst>
-          </p:nvPr>
-        </p:nvSpPr>
-        <p:spPr>
-          <a:xfrm flipH="1">
-            <a:off x="11743267" y="4013200"/>
-            <a:ext cx="448733" cy="2844800"/>
-          </a:xfrm>
-          <a:prstGeom prst="triangle">
-            <a:avLst>
-              <a:gd name="adj" fmla="val 0"/>
-            </a:avLst>
-          </a:prstGeom>
-          <a:solidFill>
-            <a:schemeClr val="accent1">
-              <a:alpha val="85000"/>
-            </a:schemeClr>
-          </a:solidFill>
-          <a:ln>
-            <a:noFill/>
-          </a:ln>
-          <a:effectLst/>
-        </p:spPr>
-        <p:style>
-          <a:lnRef idx="1">
-            <a:schemeClr val="accent1"/>
-          </a:lnRef>
-          <a:fillRef idx="3">
-            <a:schemeClr val="accent1"/>
-          </a:fillRef>
-          <a:effectRef idx="2">
-            <a:schemeClr val="accent1"/>
-          </a:effectRef>
-          <a:fontRef idx="minor">
-            <a:schemeClr val="lt1"/>
-          </a:fontRef>
-        </p:style>
-        <p:txBody>
-          <a:bodyPr/>
-          <a:lstStyle/>
-          <a:p>
-            <a:endParaRPr lang="en-BD"/>
-          </a:p>
-        </p:txBody>
-      </p:sp>
-      <p:graphicFrame>
-        <p:nvGraphicFramePr>
-          <p:cNvPr id="4" name="Content Placeholder 3">
-            <a:extLst>
-              <a:ext uri="{FF2B5EF4-FFF2-40B4-BE49-F238E27FC236}">
-                <a16:creationId xmlns:a16="http://schemas.microsoft.com/office/drawing/2014/main" id="{1F5FEE89-BCA3-9A3E-791E-08A95393966A}"/>
-              </a:ext>
-            </a:extLst>
-          </p:cNvPr>
-          <p:cNvGraphicFramePr>
-            <a:graphicFrameLocks noGrp="1"/>
-          </p:cNvGraphicFramePr>
-          <p:nvPr>
-            <p:ph idx="1"/>
-            <p:extLst>
-              <p:ext uri="{D42A27DB-BD31-4B8C-83A1-F6EECF244321}">
-                <p14:modId xmlns:p14="http://schemas.microsoft.com/office/powerpoint/2010/main" val="1767271836"/>
-              </p:ext>
-            </p:extLst>
-          </p:nvPr>
-        </p:nvGraphicFramePr>
-        <p:xfrm>
-          <a:off x="1286933" y="2276751"/>
-          <a:ext cx="9618134" cy="3437067"/>
-        </p:xfrm>
-        <a:graphic>
-          <a:graphicData uri="http://schemas.openxmlformats.org/drawingml/2006/table">
-            <a:tbl>
-              <a:tblPr firstRow="1" bandRow="1">
-                <a:tableStyleId>{5C22544A-7EE6-4342-B048-85BDC9FD1C3A}</a:tableStyleId>
-              </a:tblPr>
-              <a:tblGrid>
-                <a:gridCol w="2375882">
-                  <a:extLst>
-                    <a:ext uri="{9D8B030D-6E8A-4147-A177-3AD203B41FA5}">
-                      <a16:colId xmlns:a16="http://schemas.microsoft.com/office/drawing/2014/main" val="202611479"/>
-                    </a:ext>
-                  </a:extLst>
-                </a:gridCol>
-                <a:gridCol w="2382289">
-                  <a:extLst>
-                    <a:ext uri="{9D8B030D-6E8A-4147-A177-3AD203B41FA5}">
-                      <a16:colId xmlns:a16="http://schemas.microsoft.com/office/drawing/2014/main" val="3194293325"/>
-                    </a:ext>
-                  </a:extLst>
-                </a:gridCol>
-                <a:gridCol w="2375882">
-                  <a:extLst>
-                    <a:ext uri="{9D8B030D-6E8A-4147-A177-3AD203B41FA5}">
-                      <a16:colId xmlns:a16="http://schemas.microsoft.com/office/drawing/2014/main" val="1025652441"/>
-                    </a:ext>
-                  </a:extLst>
-                </a:gridCol>
-                <a:gridCol w="2484081">
-                  <a:extLst>
-                    <a:ext uri="{9D8B030D-6E8A-4147-A177-3AD203B41FA5}">
-                      <a16:colId xmlns:a16="http://schemas.microsoft.com/office/drawing/2014/main" val="1682647431"/>
-                    </a:ext>
-                  </a:extLst>
-                </a:gridCol>
-              </a:tblGrid>
-              <a:tr h="444797">
-                <a:tc>
-                  <a:txBody>
-                    <a:bodyPr/>
-                    <a:lstStyle/>
-                    <a:p>
-                      <a:endParaRPr lang="en-BD" sz="2000"/>
-                    </a:p>
-                  </a:txBody>
-                  <a:tcPr marL="101090" marR="101090" marT="50545" marB="50545"/>
-                </a:tc>
-                <a:tc>
-                  <a:txBody>
-                    <a:bodyPr/>
-                    <a:lstStyle/>
-                    <a:p>
-                      <a:r>
-                        <a:rPr lang="en-BD" sz="2000"/>
-                        <a:t>Canditate 1</a:t>
-                      </a:r>
-                    </a:p>
-                  </a:txBody>
-                  <a:tcPr marL="101090" marR="101090" marT="50545" marB="50545"/>
-                </a:tc>
-                <a:tc>
-                  <a:txBody>
-                    <a:bodyPr/>
-                    <a:lstStyle/>
-                    <a:p>
-                      <a:pPr marL="0" marR="0" lvl="0" indent="0" algn="l" defTabSz="457200" rtl="0" eaLnBrk="1" fontAlgn="auto" latinLnBrk="0" hangingPunct="1">
-                        <a:lnSpc>
-                          <a:spcPct val="100000"/>
-                        </a:lnSpc>
-                        <a:spcBef>
-                          <a:spcPts val="0"/>
-                        </a:spcBef>
-                        <a:spcAft>
-                          <a:spcPts val="0"/>
-                        </a:spcAft>
-                        <a:buClrTx/>
-                        <a:buSzTx/>
-                        <a:buFontTx/>
-                        <a:buNone/>
-                        <a:tabLst/>
-                        <a:defRPr/>
-                      </a:pPr>
-                      <a:r>
-                        <a:rPr lang="en-BD" sz="2000"/>
-                        <a:t>Canditate 2</a:t>
-                      </a:r>
-                    </a:p>
-                  </a:txBody>
-                  <a:tcPr marL="101090" marR="101090" marT="50545" marB="50545"/>
-                </a:tc>
-                <a:tc>
-                  <a:txBody>
-                    <a:bodyPr/>
-                    <a:lstStyle/>
-                    <a:p>
-                      <a:pPr marL="0" marR="0" lvl="0" indent="0" algn="l" defTabSz="457200" rtl="0" eaLnBrk="1" fontAlgn="auto" latinLnBrk="0" hangingPunct="1">
-                        <a:lnSpc>
-                          <a:spcPct val="100000"/>
-                        </a:lnSpc>
-                        <a:spcBef>
-                          <a:spcPts val="0"/>
-                        </a:spcBef>
-                        <a:spcAft>
-                          <a:spcPts val="0"/>
-                        </a:spcAft>
-                        <a:buClrTx/>
-                        <a:buSzTx/>
-                        <a:buFontTx/>
-                        <a:buNone/>
-                        <a:tabLst/>
-                        <a:defRPr/>
-                      </a:pPr>
-                      <a:r>
-                        <a:rPr lang="en-BD" sz="2000"/>
-                        <a:t>Canditate 3</a:t>
-                      </a:r>
-                    </a:p>
-                  </a:txBody>
-                  <a:tcPr marL="101090" marR="101090" marT="50545" marB="50545"/>
-                </a:tc>
-                <a:extLst>
-                  <a:ext uri="{0D108BD9-81ED-4DB2-BD59-A6C34878D82A}">
-                    <a16:rowId xmlns:a16="http://schemas.microsoft.com/office/drawing/2014/main" val="527192938"/>
-                  </a:ext>
-                </a:extLst>
-              </a:tr>
-              <a:tr h="444797">
-                <a:tc>
-                  <a:txBody>
-                    <a:bodyPr/>
-                    <a:lstStyle/>
-                    <a:p>
-                      <a:r>
-                        <a:rPr lang="en-BD" sz="2000" dirty="0"/>
-                        <a:t>Understanding</a:t>
-                      </a:r>
-                    </a:p>
-                  </a:txBody>
-                  <a:tcPr marL="101090" marR="101090" marT="50545" marB="50545"/>
-                </a:tc>
-                <a:tc>
-                  <a:txBody>
-                    <a:bodyPr/>
-                    <a:lstStyle/>
-                    <a:p>
-                      <a:r>
-                        <a:rPr lang="en-BD" sz="2000" dirty="0"/>
-                        <a:t>Yes</a:t>
-                      </a:r>
-                    </a:p>
-                  </a:txBody>
-                  <a:tcPr marL="101090" marR="101090" marT="50545" marB="50545"/>
-                </a:tc>
-                <a:tc>
-                  <a:txBody>
-                    <a:bodyPr/>
-                    <a:lstStyle/>
-                    <a:p>
-                      <a:r>
-                        <a:rPr lang="en-BD" sz="2000"/>
-                        <a:t>Yes</a:t>
-                      </a:r>
-                    </a:p>
-                  </a:txBody>
-                  <a:tcPr marL="101090" marR="101090" marT="50545" marB="50545"/>
-                </a:tc>
-                <a:tc>
-                  <a:txBody>
-                    <a:bodyPr/>
-                    <a:lstStyle/>
-                    <a:p>
-                      <a:r>
-                        <a:rPr lang="en-BD" sz="2000"/>
-                        <a:t>Partly</a:t>
-                      </a:r>
-                    </a:p>
-                  </a:txBody>
-                  <a:tcPr marL="101090" marR="101090" marT="50545" marB="50545"/>
-                </a:tc>
-                <a:extLst>
-                  <a:ext uri="{0D108BD9-81ED-4DB2-BD59-A6C34878D82A}">
-                    <a16:rowId xmlns:a16="http://schemas.microsoft.com/office/drawing/2014/main" val="1649843950"/>
-                  </a:ext>
-                </a:extLst>
-              </a:tr>
-              <a:tr h="444797">
-                <a:tc>
-                  <a:txBody>
-                    <a:bodyPr/>
-                    <a:lstStyle/>
-                    <a:p>
-                      <a:r>
-                        <a:rPr lang="en-BD" sz="2000" dirty="0"/>
-                        <a:t>Support Needed</a:t>
-                      </a:r>
-                    </a:p>
-                  </a:txBody>
-                  <a:tcPr marL="101090" marR="101090" marT="50545" marB="50545"/>
-                </a:tc>
-                <a:tc>
-                  <a:txBody>
-                    <a:bodyPr/>
-                    <a:lstStyle/>
-                    <a:p>
-                      <a:r>
-                        <a:rPr lang="en-BD" sz="2000" dirty="0"/>
-                        <a:t>Yes</a:t>
-                      </a:r>
-                    </a:p>
-                  </a:txBody>
-                  <a:tcPr marL="101090" marR="101090" marT="50545" marB="50545"/>
-                </a:tc>
-                <a:tc>
-                  <a:txBody>
-                    <a:bodyPr/>
-                    <a:lstStyle/>
-                    <a:p>
-                      <a:r>
-                        <a:rPr lang="en-BD" sz="2000" dirty="0"/>
-                        <a:t>No</a:t>
-                      </a:r>
-                    </a:p>
-                  </a:txBody>
-                  <a:tcPr marL="101090" marR="101090" marT="50545" marB="50545"/>
-                </a:tc>
-                <a:tc>
-                  <a:txBody>
-                    <a:bodyPr/>
-                    <a:lstStyle/>
-                    <a:p>
-                      <a:r>
-                        <a:rPr lang="en-BD" sz="2000"/>
-                        <a:t>Yes</a:t>
-                      </a:r>
-                    </a:p>
-                  </a:txBody>
-                  <a:tcPr marL="101090" marR="101090" marT="50545" marB="50545"/>
-                </a:tc>
-                <a:extLst>
-                  <a:ext uri="{0D108BD9-81ED-4DB2-BD59-A6C34878D82A}">
-                    <a16:rowId xmlns:a16="http://schemas.microsoft.com/office/drawing/2014/main" val="967924198"/>
-                  </a:ext>
-                </a:extLst>
-              </a:tr>
-              <a:tr h="444797">
-                <a:tc>
-                  <a:txBody>
-                    <a:bodyPr/>
-                    <a:lstStyle/>
-                    <a:p>
-                      <a:r>
-                        <a:rPr lang="en-BD" sz="2000" dirty="0"/>
-                        <a:t>Correct Answer</a:t>
-                      </a:r>
-                    </a:p>
-                  </a:txBody>
-                  <a:tcPr marL="101090" marR="101090" marT="50545" marB="50545"/>
-                </a:tc>
-                <a:tc>
-                  <a:txBody>
-                    <a:bodyPr/>
-                    <a:lstStyle/>
-                    <a:p>
-                      <a:r>
-                        <a:rPr lang="en-BD" sz="2000"/>
-                        <a:t>Yes</a:t>
-                      </a:r>
-                    </a:p>
-                  </a:txBody>
-                  <a:tcPr marL="101090" marR="101090" marT="50545" marB="50545"/>
-                </a:tc>
-                <a:tc>
-                  <a:txBody>
-                    <a:bodyPr/>
-                    <a:lstStyle/>
-                    <a:p>
-                      <a:r>
-                        <a:rPr lang="en-BD" sz="2000"/>
-                        <a:t>Yes</a:t>
-                      </a:r>
-                    </a:p>
-                  </a:txBody>
-                  <a:tcPr marL="101090" marR="101090" marT="50545" marB="50545"/>
-                </a:tc>
-                <a:tc>
-                  <a:txBody>
-                    <a:bodyPr/>
-                    <a:lstStyle/>
-                    <a:p>
-                      <a:r>
-                        <a:rPr lang="en-BD" sz="2000" dirty="0"/>
-                        <a:t>Partly</a:t>
-                      </a:r>
-                    </a:p>
-                  </a:txBody>
-                  <a:tcPr marL="101090" marR="101090" marT="50545" marB="50545"/>
-                </a:tc>
-                <a:extLst>
-                  <a:ext uri="{0D108BD9-81ED-4DB2-BD59-A6C34878D82A}">
-                    <a16:rowId xmlns:a16="http://schemas.microsoft.com/office/drawing/2014/main" val="1442486957"/>
-                  </a:ext>
-                </a:extLst>
-              </a:tr>
-              <a:tr h="1657879">
-                <a:tc>
-                  <a:txBody>
-                    <a:bodyPr/>
-                    <a:lstStyle/>
-                    <a:p>
-                      <a:r>
-                        <a:rPr lang="en-BD" sz="2000" dirty="0"/>
-                        <a:t>Feedback</a:t>
-                      </a:r>
-                    </a:p>
-                  </a:txBody>
-                  <a:tcPr marL="101090" marR="101090" marT="50545" marB="50545"/>
-                </a:tc>
-                <a:tc>
-                  <a:txBody>
-                    <a:bodyPr/>
-                    <a:lstStyle/>
-                    <a:p>
-                      <a:r>
-                        <a:rPr lang="en-GB" sz="2000" dirty="0"/>
-                        <a:t>Finding filter was not so obvious; one has to look at the BAN.</a:t>
-                      </a:r>
-                      <a:endParaRPr lang="en-BD" sz="2000" dirty="0"/>
-                    </a:p>
-                  </a:txBody>
-                  <a:tcPr marL="101090" marR="101090" marT="50545" marB="50545"/>
-                </a:tc>
-                <a:tc>
-                  <a:txBody>
-                    <a:bodyPr/>
-                    <a:lstStyle/>
-                    <a:p>
-                      <a:r>
-                        <a:rPr lang="en-BD" sz="2000" dirty="0"/>
-                        <a:t>No feedback provided</a:t>
-                      </a:r>
-                    </a:p>
-                  </a:txBody>
-                  <a:tcPr marL="101090" marR="101090" marT="50545" marB="50545"/>
-                </a:tc>
-                <a:tc>
-                  <a:txBody>
-                    <a:bodyPr/>
-                    <a:lstStyle/>
-                    <a:p>
-                      <a:r>
-                        <a:rPr lang="en-GB" sz="2000" dirty="0"/>
-                        <a:t>Only issue was uncertainty about 'currently'; unclear that only 'operating' should be selected.</a:t>
-                      </a:r>
-                      <a:endParaRPr lang="en-BD" sz="2000" dirty="0"/>
-                    </a:p>
-                  </a:txBody>
-                  <a:tcPr marL="101090" marR="101090" marT="50545" marB="50545"/>
-                </a:tc>
-                <a:extLst>
-                  <a:ext uri="{0D108BD9-81ED-4DB2-BD59-A6C34878D82A}">
-                    <a16:rowId xmlns:a16="http://schemas.microsoft.com/office/drawing/2014/main" val="2529668582"/>
-                  </a:ext>
-                </a:extLst>
-              </a:tr>
-            </a:tbl>
-          </a:graphicData>
-        </a:graphic>
-      </p:graphicFrame>
-      <p:sp>
-        <p:nvSpPr>
-          <p:cNvPr id="8" name="Rounded Rectangle 7"/>
-          <p:cNvSpPr/>
-          <p:nvPr/>
-        </p:nvSpPr>
-        <p:spPr>
-          <a:xfrm>
-            <a:off x="1192306" y="2967318"/>
-            <a:ext cx="2770094" cy="1685364"/>
-          </a:xfrm>
-          <a:prstGeom prst="roundRect">
-            <a:avLst/>
-          </a:prstGeom>
-          <a:solidFill>
-            <a:schemeClr val="accent4"/>
-          </a:solidFill>
-          <a:ln>
-            <a:noFill/>
-          </a:ln>
-        </p:spPr>
-        <p:style>
-          <a:lnRef idx="0">
-            <a:scrgbClr r="0" g="0" b="0"/>
-          </a:lnRef>
-          <a:fillRef idx="0">
-            <a:scrgbClr r="0" g="0" b="0"/>
-          </a:fillRef>
-          <a:effectRef idx="0">
-            <a:scrgbClr r="0" g="0" b="0"/>
-          </a:effectRef>
-          <a:fontRef idx="minor">
-            <a:schemeClr val="lt1"/>
-          </a:fontRef>
-        </p:style>
-        <p:txBody>
-          <a:bodyPr rtlCol="0" anchor="ctr"/>
-          <a:lstStyle/>
-          <a:p>
-            <a:pPr algn="ctr"/>
-            <a:r>
-              <a:rPr lang="en-BE" dirty="0" smtClean="0"/>
-              <a:t>remove</a:t>
-            </a:r>
-            <a:endParaRPr lang="nl-BE" dirty="0"/>
-          </a:p>
-        </p:txBody>
-      </p:sp>
-    </p:spTree>
-    <p:extLst>
-      <p:ext uri="{BB962C8B-B14F-4D97-AF65-F5344CB8AC3E}">
-        <p14:creationId xmlns:p14="http://schemas.microsoft.com/office/powerpoint/2010/main" val="883096042"/>
-      </p:ext>
-    </p:extLst>
-  </p:cSld>
-  <p:clrMapOvr>
-    <a:masterClrMapping/>
-  </p:clrMapOvr>
-  <mc:AlternateContent xmlns:mc="http://schemas.openxmlformats.org/markup-compatibility/2006" xmlns:p14="http://schemas.microsoft.com/office/powerpoint/2010/main">
-    <mc:Choice Requires="p14">
-      <p:transition spd="slow" p14:dur="2000"/>
-    </mc:Choice>
-    <mc:Fallback xmlns="">
-      <p:transition spd="slow"/>
-    </mc:Fallback>
-  </mc:AlternateContent>
-  <p:timing>
-    <p:tnLst>
-      <p:par>
-        <p:cTn id="1" dur="indefinite" restart="never" nodeType="tmRoot"/>
-      </p:par>
-    </p:tnLst>
-  </p:timing>
-</p:sld>
-</file>
-
-<file path=ppt/slides/slide9.xml><?xml version="1.0" encoding="utf-8"?>
-<p:sld xmlns:a="http://schemas.openxmlformats.org/drawingml/2006/main" xmlns:r="http://schemas.openxmlformats.org/officeDocument/2006/relationships" xmlns:p="http://schemas.openxmlformats.org/presentationml/2006/main" show="0">
+<p:sld xmlns:a="http://schemas.openxmlformats.org/drawingml/2006/main" xmlns:r="http://schemas.openxmlformats.org/officeDocument/2006/relationships" xmlns:p="http://schemas.openxmlformats.org/presentationml/2006/main">
   <p:cSld>
     <p:spTree>
       <p:nvGrpSpPr>
@@ -18874,13 +16036,7 @@
       </p:grpSpPr>
       <p:sp>
         <p:nvSpPr>
-          <p:cNvPr id="2" name="Title 1">
-            <a:extLst>
-              <a:ext uri="{FF2B5EF4-FFF2-40B4-BE49-F238E27FC236}">
-                <a16:creationId xmlns:a16="http://schemas.microsoft.com/office/drawing/2014/main" id="{BD1C97D6-8ADE-08DD-6FBA-C137C36F7BBD}"/>
-              </a:ext>
-            </a:extLst>
-          </p:cNvPr>
+          <p:cNvPr id="2" name="Title 1"/>
           <p:cNvSpPr>
             <a:spLocks noGrp="1"/>
           </p:cNvSpPr>
@@ -18893,19 +16049,17 @@
           <a:bodyPr/>
           <a:lstStyle/>
           <a:p>
-            <a:endParaRPr lang="en-BD" dirty="0"/>
+            <a:r>
+              <a:rPr lang="en-BE" dirty="0"/>
+              <a:t>Evaluation takeaways</a:t>
+            </a:r>
+            <a:endParaRPr lang="nl-BE" dirty="0"/>
           </a:p>
         </p:txBody>
       </p:sp>
       <p:sp>
         <p:nvSpPr>
-          <p:cNvPr id="3" name="Content Placeholder 2">
-            <a:extLst>
-              <a:ext uri="{FF2B5EF4-FFF2-40B4-BE49-F238E27FC236}">
-                <a16:creationId xmlns:a16="http://schemas.microsoft.com/office/drawing/2014/main" id="{EF5F27F1-48BD-2F1D-767F-DC20881E2E83}"/>
-              </a:ext>
-            </a:extLst>
-          </p:cNvPr>
+          <p:cNvPr id="3" name="Content Placeholder 2"/>
           <p:cNvSpPr>
             <a:spLocks noGrp="1"/>
           </p:cNvSpPr>
@@ -18913,784 +16067,205 @@
             <p:ph idx="1"/>
           </p:nvPr>
         </p:nvSpPr>
-        <p:spPr/>
+        <p:spPr>
+          <a:xfrm>
+            <a:off x="677334" y="1930401"/>
+            <a:ext cx="8596668" cy="4110962"/>
+          </a:xfrm>
+        </p:spPr>
         <p:txBody>
-          <a:bodyPr/>
+          <a:bodyPr>
+            <a:normAutofit lnSpcReduction="10000"/>
+          </a:bodyPr>
           <a:lstStyle/>
           <a:p>
-            <a:endParaRPr lang="en-BD" dirty="0"/>
+            <a:pPr marL="0" indent="0">
+              <a:buNone/>
+            </a:pPr>
+            <a:r>
+              <a:rPr lang="en-BE" b="1" dirty="0"/>
+              <a:t>Positive</a:t>
+            </a:r>
+            <a:r>
+              <a:rPr lang="en-BE" dirty="0"/>
+              <a:t> feedback received:</a:t>
+            </a:r>
+          </a:p>
+          <a:p>
+            <a:r>
+              <a:rPr lang="en-BE" dirty="0"/>
+              <a:t>Easy on the eyes</a:t>
+            </a:r>
+          </a:p>
+          <a:p>
+            <a:r>
+              <a:rPr lang="en-BE" dirty="0"/>
+              <a:t>Intuitive F-shape layout</a:t>
+            </a:r>
+          </a:p>
+          <a:p>
+            <a:r>
+              <a:rPr lang="en-BE" dirty="0"/>
+              <a:t>Colour channel consistency for status was highly appreciated</a:t>
+            </a:r>
+          </a:p>
+          <a:p>
+            <a:r>
+              <a:rPr lang="en-BE" dirty="0"/>
+              <a:t>BAN’s are very usefull to extract the totals</a:t>
+            </a:r>
+          </a:p>
+          <a:p>
+            <a:pPr marL="0" indent="0">
+              <a:buNone/>
+            </a:pPr>
+            <a:endParaRPr lang="en-BE" dirty="0"/>
+          </a:p>
+          <a:p>
+            <a:pPr marL="0" indent="0">
+              <a:buNone/>
+            </a:pPr>
+            <a:r>
+              <a:rPr lang="en-BE" b="1" dirty="0"/>
+              <a:t>Constructive</a:t>
+            </a:r>
+            <a:r>
+              <a:rPr lang="en-BE" dirty="0"/>
+              <a:t> feedback received is usefull for future iterations of the product:</a:t>
+            </a:r>
+          </a:p>
+          <a:p>
+            <a:r>
+              <a:rPr lang="en-BE" dirty="0"/>
+              <a:t>Having empty filters when parent levels are not set is confusing to users</a:t>
+            </a:r>
+          </a:p>
+          <a:p>
+            <a:r>
+              <a:rPr lang="en-BE" dirty="0"/>
+              <a:t>The slider could use a tooltip so users know what exactly is being filtered on</a:t>
+            </a:r>
+          </a:p>
+          <a:p>
+            <a:r>
+              <a:rPr lang="en-BE" dirty="0"/>
+              <a:t>Users should know what time the data was ‘snapshotted’ to properly understand when a unit is in ‘future’ state</a:t>
+            </a:r>
+          </a:p>
+          <a:p>
+            <a:endParaRPr lang="nl-BE" dirty="0"/>
           </a:p>
         </p:txBody>
       </p:sp>
-      <p:sp useBgFill="1">
-        <p:nvSpPr>
-          <p:cNvPr id="4" name="Rectangle 3">
+      <p:pic>
+        <p:nvPicPr>
+          <p:cNvPr id="1026" name="Picture 2" descr="Key Takeaway Speech Bubble Icon Stock Illustration - Download Image Now -  Key, Take Out Food, Icon Symbol - iStock"/>
+          <p:cNvPicPr>
+            <a:picLocks noChangeAspect="1" noChangeArrowheads="1"/>
+          </p:cNvPicPr>
+          <p:nvPr/>
+        </p:nvPicPr>
+        <p:blipFill rotWithShape="1">
+          <a:blip r:embed="rId3" cstate="print">
+            <a:duotone>
+              <a:schemeClr val="accent2">
+                <a:shade val="45000"/>
+                <a:satMod val="135000"/>
+              </a:schemeClr>
+              <a:prstClr val="white"/>
+            </a:duotone>
             <a:extLst>
-              <a:ext uri="{FF2B5EF4-FFF2-40B4-BE49-F238E27FC236}">
-                <a16:creationId xmlns:a16="http://schemas.microsoft.com/office/drawing/2014/main" id="{4FA2E581-75F6-ED53-4C73-35F4031413CB}"/>
-              </a:ext>
-              <a:ext uri="{C183D7F6-B498-43B3-948B-1728B52AA6E4}">
-                <adec:decorative xmlns:adec="http://schemas.microsoft.com/office/drawing/2017/decorative" xmlns="" val="1"/>
+              <a:ext uri="{28A0092B-C50C-407E-A947-70E740481C1C}">
+                <a14:useLocalDpi xmlns:a14="http://schemas.microsoft.com/office/drawing/2010/main" val="0"/>
               </a:ext>
             </a:extLst>
-          </p:cNvPr>
-          <p:cNvSpPr/>
-          <p:nvPr>
-            <p:extLst>
-              <p:ext uri="{386F3935-93C4-4BCD-93E2-E3B085C9AB24}">
-                <p16:designElem xmlns:p16="http://schemas.microsoft.com/office/powerpoint/2015/main" val="1"/>
-              </p:ext>
-            </p:extLst>
-          </p:nvPr>
-        </p:nvSpPr>
-        <p:spPr>
+          </a:blip>
+          <a:srcRect l="20838" t="25645" r="13996" b="23185"/>
+          <a:stretch/>
+        </p:blipFill>
+        <p:spPr bwMode="auto">
           <a:xfrm>
-            <a:off x="0" y="0"/>
-            <a:ext cx="12192000" cy="6858000"/>
+            <a:off x="6373905" y="379411"/>
+            <a:ext cx="1335742" cy="1048872"/>
           </a:xfrm>
           <a:prstGeom prst="rect">
             <a:avLst/>
           </a:prstGeom>
-          <a:ln>
-            <a:noFill/>
-          </a:ln>
+          <a:noFill/>
+          <a:extLst>
+            <a:ext uri="{909E8E84-426E-40DD-AFC4-6F175D3DCCD1}">
+              <a14:hiddenFill xmlns:a14="http://schemas.microsoft.com/office/drawing/2010/main">
+                <a:solidFill>
+                  <a:srgbClr val="FFFFFF"/>
+                </a:solidFill>
+              </a14:hiddenFill>
+            </a:ext>
+          </a:extLst>
         </p:spPr>
-        <p:style>
-          <a:lnRef idx="2">
-            <a:schemeClr val="accent1">
-              <a:shade val="50000"/>
-            </a:schemeClr>
-          </a:lnRef>
-          <a:fillRef idx="1">
-            <a:schemeClr val="accent1"/>
-          </a:fillRef>
-          <a:effectRef idx="0">
-            <a:schemeClr val="accent1"/>
-          </a:effectRef>
-          <a:fontRef idx="minor">
-            <a:schemeClr val="lt1"/>
-          </a:fontRef>
-        </p:style>
-        <p:txBody>
-          <a:bodyPr rtlCol="0" anchor="ctr"/>
-          <a:lstStyle/>
-          <a:p>
-            <a:pPr algn="ctr"/>
-            <a:endParaRPr lang="en-US"/>
-          </a:p>
-        </p:txBody>
-      </p:sp>
-      <p:sp>
-        <p:nvSpPr>
-          <p:cNvPr id="5" name="Title 1">
-            <a:extLst>
-              <a:ext uri="{FF2B5EF4-FFF2-40B4-BE49-F238E27FC236}">
-                <a16:creationId xmlns:a16="http://schemas.microsoft.com/office/drawing/2014/main" id="{E7E934CB-E6E8-62C7-772A-2AC8763A01DF}"/>
-              </a:ext>
-            </a:extLst>
-          </p:cNvPr>
-          <p:cNvSpPr txBox="1">
-            <a:spLocks/>
-          </p:cNvSpPr>
-          <p:nvPr/>
-        </p:nvSpPr>
-        <p:spPr>
-          <a:xfrm>
-            <a:off x="1286933" y="609600"/>
-            <a:ext cx="10197494" cy="1099457"/>
-          </a:xfrm>
-          <a:prstGeom prst="rect">
-            <a:avLst/>
-          </a:prstGeom>
-        </p:spPr>
-        <p:txBody>
-          <a:bodyPr vert="horz" lIns="91440" tIns="45720" rIns="91440" bIns="45720" rtlCol="0" anchor="t">
-            <a:normAutofit/>
-          </a:bodyPr>
-          <a:lstStyle>
-            <a:lvl1pPr algn="l" defTabSz="457200" rtl="0" eaLnBrk="1" latinLnBrk="0" hangingPunct="1">
-              <a:spcBef>
-                <a:spcPct val="0"/>
-              </a:spcBef>
-              <a:buNone/>
-              <a:defRPr sz="3600" kern="1200">
-                <a:solidFill>
-                  <a:schemeClr val="accent1"/>
-                </a:solidFill>
-                <a:latin typeface="+mj-lt"/>
-                <a:ea typeface="+mj-ea"/>
-                <a:cs typeface="+mj-cs"/>
-              </a:defRPr>
-            </a:lvl1pPr>
-            <a:lvl2pPr eaLnBrk="1" hangingPunct="1">
-              <a:defRPr>
-                <a:solidFill>
-                  <a:schemeClr val="tx2"/>
-                </a:solidFill>
-              </a:defRPr>
-            </a:lvl2pPr>
-            <a:lvl3pPr eaLnBrk="1" hangingPunct="1">
-              <a:defRPr>
-                <a:solidFill>
-                  <a:schemeClr val="tx2"/>
-                </a:solidFill>
-              </a:defRPr>
-            </a:lvl3pPr>
-            <a:lvl4pPr eaLnBrk="1" hangingPunct="1">
-              <a:defRPr>
-                <a:solidFill>
-                  <a:schemeClr val="tx2"/>
-                </a:solidFill>
-              </a:defRPr>
-            </a:lvl4pPr>
-            <a:lvl5pPr eaLnBrk="1" hangingPunct="1">
-              <a:defRPr>
-                <a:solidFill>
-                  <a:schemeClr val="tx2"/>
-                </a:solidFill>
-              </a:defRPr>
-            </a:lvl5pPr>
-            <a:lvl6pPr eaLnBrk="1" hangingPunct="1">
-              <a:defRPr>
-                <a:solidFill>
-                  <a:schemeClr val="tx2"/>
-                </a:solidFill>
-              </a:defRPr>
-            </a:lvl6pPr>
-            <a:lvl7pPr eaLnBrk="1" hangingPunct="1">
-              <a:defRPr>
-                <a:solidFill>
-                  <a:schemeClr val="tx2"/>
-                </a:solidFill>
-              </a:defRPr>
-            </a:lvl7pPr>
-            <a:lvl8pPr eaLnBrk="1" hangingPunct="1">
-              <a:defRPr>
-                <a:solidFill>
-                  <a:schemeClr val="tx2"/>
-                </a:solidFill>
-              </a:defRPr>
-            </a:lvl8pPr>
-            <a:lvl9pPr eaLnBrk="1" hangingPunct="1">
-              <a:defRPr>
-                <a:solidFill>
-                  <a:schemeClr val="tx2"/>
-                </a:solidFill>
-              </a:defRPr>
-            </a:lvl9pPr>
-          </a:lstStyle>
-          <a:p>
-            <a:pPr>
-              <a:lnSpc>
-                <a:spcPct val="90000"/>
-              </a:lnSpc>
-            </a:pPr>
-            <a:r>
-              <a:rPr lang="en-BD" dirty="0"/>
-              <a:t>Question 2: </a:t>
-            </a:r>
-            <a:r>
-              <a:rPr lang="en-GB" dirty="0"/>
-              <a:t>In future years, will the world invest more in onshore or offshore wind?</a:t>
-            </a:r>
-            <a:endParaRPr lang="en-BD" dirty="0"/>
-          </a:p>
-        </p:txBody>
-      </p:sp>
-      <p:sp>
-        <p:nvSpPr>
-          <p:cNvPr id="6" name="Isosceles Triangle 10">
-            <a:extLst>
-              <a:ext uri="{FF2B5EF4-FFF2-40B4-BE49-F238E27FC236}">
-                <a16:creationId xmlns:a16="http://schemas.microsoft.com/office/drawing/2014/main" id="{3E3F0872-2E5E-4902-E06E-D16B11A5FF92}"/>
-              </a:ext>
-              <a:ext uri="{C183D7F6-B498-43B3-948B-1728B52AA6E4}">
-                <adec:decorative xmlns:adec="http://schemas.microsoft.com/office/drawing/2017/decorative" xmlns="" val="1"/>
-              </a:ext>
-            </a:extLst>
-          </p:cNvPr>
-          <p:cNvSpPr/>
-          <p:nvPr>
-            <p:extLst>
-              <p:ext uri="{386F3935-93C4-4BCD-93E2-E3B085C9AB24}">
-                <p16:designElem xmlns:p16="http://schemas.microsoft.com/office/powerpoint/2015/main" val="1"/>
-              </p:ext>
-            </p:extLst>
-          </p:nvPr>
-        </p:nvSpPr>
-        <p:spPr>
-          <a:xfrm rot="10800000">
-            <a:off x="0" y="0"/>
-            <a:ext cx="842596" cy="5666154"/>
-          </a:xfrm>
-          <a:prstGeom prst="triangle">
-            <a:avLst>
-              <a:gd name="adj" fmla="val 100000"/>
-            </a:avLst>
-          </a:prstGeom>
-          <a:solidFill>
-            <a:schemeClr val="accent1">
-              <a:alpha val="85000"/>
-            </a:schemeClr>
-          </a:solidFill>
-          <a:ln>
-            <a:noFill/>
-          </a:ln>
-          <a:effectLst/>
-        </p:spPr>
-        <p:style>
-          <a:lnRef idx="1">
-            <a:schemeClr val="accent1"/>
-          </a:lnRef>
-          <a:fillRef idx="3">
-            <a:schemeClr val="accent1"/>
-          </a:fillRef>
-          <a:effectRef idx="2">
-            <a:schemeClr val="accent1"/>
-          </a:effectRef>
-          <a:fontRef idx="minor">
-            <a:schemeClr val="lt1"/>
-          </a:fontRef>
-        </p:style>
-        <p:txBody>
-          <a:bodyPr/>
-          <a:lstStyle/>
-          <a:p>
-            <a:endParaRPr lang="en-BD"/>
-          </a:p>
-        </p:txBody>
-      </p:sp>
-      <p:sp>
-        <p:nvSpPr>
-          <p:cNvPr id="7" name="Isosceles Triangle 12">
-            <a:extLst>
-              <a:ext uri="{FF2B5EF4-FFF2-40B4-BE49-F238E27FC236}">
-                <a16:creationId xmlns:a16="http://schemas.microsoft.com/office/drawing/2014/main" id="{F56ABBA3-7390-B1BF-0A7B-35721A2A2692}"/>
-              </a:ext>
-              <a:ext uri="{C183D7F6-B498-43B3-948B-1728B52AA6E4}">
-                <adec:decorative xmlns:adec="http://schemas.microsoft.com/office/drawing/2017/decorative" xmlns="" val="1"/>
-              </a:ext>
-            </a:extLst>
-          </p:cNvPr>
-          <p:cNvSpPr/>
-          <p:nvPr>
-            <p:extLst>
-              <p:ext uri="{386F3935-93C4-4BCD-93E2-E3B085C9AB24}">
-                <p16:designElem xmlns:p16="http://schemas.microsoft.com/office/powerpoint/2015/main" val="1"/>
-              </p:ext>
-            </p:extLst>
-          </p:nvPr>
-        </p:nvSpPr>
-        <p:spPr>
-          <a:xfrm flipH="1">
-            <a:off x="11743267" y="4013200"/>
-            <a:ext cx="448733" cy="2844800"/>
-          </a:xfrm>
-          <a:prstGeom prst="triangle">
-            <a:avLst>
-              <a:gd name="adj" fmla="val 0"/>
-            </a:avLst>
-          </a:prstGeom>
-          <a:solidFill>
-            <a:schemeClr val="accent1">
-              <a:alpha val="85000"/>
-            </a:schemeClr>
-          </a:solidFill>
-          <a:ln>
-            <a:noFill/>
-          </a:ln>
-          <a:effectLst/>
-        </p:spPr>
-        <p:style>
-          <a:lnRef idx="1">
-            <a:schemeClr val="accent1"/>
-          </a:lnRef>
-          <a:fillRef idx="3">
-            <a:schemeClr val="accent1"/>
-          </a:fillRef>
-          <a:effectRef idx="2">
-            <a:schemeClr val="accent1"/>
-          </a:effectRef>
-          <a:fontRef idx="minor">
-            <a:schemeClr val="lt1"/>
-          </a:fontRef>
-        </p:style>
-        <p:txBody>
-          <a:bodyPr/>
-          <a:lstStyle/>
-          <a:p>
-            <a:endParaRPr lang="en-BD"/>
-          </a:p>
-        </p:txBody>
-      </p:sp>
-      <p:graphicFrame>
-        <p:nvGraphicFramePr>
-          <p:cNvPr id="8" name="Content Placeholder 3">
-            <a:extLst>
-              <a:ext uri="{FF2B5EF4-FFF2-40B4-BE49-F238E27FC236}">
-                <a16:creationId xmlns:a16="http://schemas.microsoft.com/office/drawing/2014/main" id="{154CF8BA-FE17-6C4A-1C89-37C2017AFCC6}"/>
-              </a:ext>
-            </a:extLst>
-          </p:cNvPr>
-          <p:cNvGraphicFramePr>
-            <a:graphicFrameLocks/>
-          </p:cNvGraphicFramePr>
-          <p:nvPr>
-            <p:extLst>
-              <p:ext uri="{D42A27DB-BD31-4B8C-83A1-F6EECF244321}">
-                <p14:modId xmlns:p14="http://schemas.microsoft.com/office/powerpoint/2010/main" val="2501084102"/>
-              </p:ext>
-            </p:extLst>
-          </p:nvPr>
-        </p:nvGraphicFramePr>
-        <p:xfrm>
-          <a:off x="1286933" y="2276751"/>
-          <a:ext cx="9618134" cy="3709078"/>
-        </p:xfrm>
-        <a:graphic>
-          <a:graphicData uri="http://schemas.openxmlformats.org/drawingml/2006/table">
-            <a:tbl>
-              <a:tblPr firstRow="1" bandRow="1">
-                <a:tableStyleId>{5C22544A-7EE6-4342-B048-85BDC9FD1C3A}</a:tableStyleId>
-              </a:tblPr>
-              <a:tblGrid>
-                <a:gridCol w="2375882">
-                  <a:extLst>
-                    <a:ext uri="{9D8B030D-6E8A-4147-A177-3AD203B41FA5}">
-                      <a16:colId xmlns:a16="http://schemas.microsoft.com/office/drawing/2014/main" val="202611479"/>
-                    </a:ext>
-                  </a:extLst>
-                </a:gridCol>
-                <a:gridCol w="2382289">
-                  <a:extLst>
-                    <a:ext uri="{9D8B030D-6E8A-4147-A177-3AD203B41FA5}">
-                      <a16:colId xmlns:a16="http://schemas.microsoft.com/office/drawing/2014/main" val="3194293325"/>
-                    </a:ext>
-                  </a:extLst>
-                </a:gridCol>
-                <a:gridCol w="2375882">
-                  <a:extLst>
-                    <a:ext uri="{9D8B030D-6E8A-4147-A177-3AD203B41FA5}">
-                      <a16:colId xmlns:a16="http://schemas.microsoft.com/office/drawing/2014/main" val="1025652441"/>
-                    </a:ext>
-                  </a:extLst>
-                </a:gridCol>
-                <a:gridCol w="2484081">
-                  <a:extLst>
-                    <a:ext uri="{9D8B030D-6E8A-4147-A177-3AD203B41FA5}">
-                      <a16:colId xmlns:a16="http://schemas.microsoft.com/office/drawing/2014/main" val="1682647431"/>
-                    </a:ext>
-                  </a:extLst>
-                </a:gridCol>
-              </a:tblGrid>
-              <a:tr h="444797">
-                <a:tc>
-                  <a:txBody>
-                    <a:bodyPr/>
-                    <a:lstStyle/>
-                    <a:p>
-                      <a:endParaRPr lang="en-BD" sz="2000"/>
-                    </a:p>
-                  </a:txBody>
-                  <a:tcPr marL="101090" marR="101090" marT="50545" marB="50545"/>
-                </a:tc>
-                <a:tc>
-                  <a:txBody>
-                    <a:bodyPr/>
-                    <a:lstStyle/>
-                    <a:p>
-                      <a:r>
-                        <a:rPr lang="en-BD" sz="2000"/>
-                        <a:t>Canditate 1</a:t>
-                      </a:r>
-                    </a:p>
-                  </a:txBody>
-                  <a:tcPr marL="101090" marR="101090" marT="50545" marB="50545"/>
-                </a:tc>
-                <a:tc>
-                  <a:txBody>
-                    <a:bodyPr/>
-                    <a:lstStyle/>
-                    <a:p>
-                      <a:pPr marL="0" marR="0" lvl="0" indent="0" algn="l" defTabSz="457200" rtl="0" eaLnBrk="1" fontAlgn="auto" latinLnBrk="0" hangingPunct="1">
-                        <a:lnSpc>
-                          <a:spcPct val="100000"/>
-                        </a:lnSpc>
-                        <a:spcBef>
-                          <a:spcPts val="0"/>
-                        </a:spcBef>
-                        <a:spcAft>
-                          <a:spcPts val="0"/>
-                        </a:spcAft>
-                        <a:buClrTx/>
-                        <a:buSzTx/>
-                        <a:buFontTx/>
-                        <a:buNone/>
-                        <a:tabLst/>
-                        <a:defRPr/>
-                      </a:pPr>
-                      <a:r>
-                        <a:rPr lang="en-BD" sz="2000"/>
-                        <a:t>Canditate 2</a:t>
-                      </a:r>
-                    </a:p>
-                  </a:txBody>
-                  <a:tcPr marL="101090" marR="101090" marT="50545" marB="50545"/>
-                </a:tc>
-                <a:tc>
-                  <a:txBody>
-                    <a:bodyPr/>
-                    <a:lstStyle/>
-                    <a:p>
-                      <a:pPr marL="0" marR="0" lvl="0" indent="0" algn="l" defTabSz="457200" rtl="0" eaLnBrk="1" fontAlgn="auto" latinLnBrk="0" hangingPunct="1">
-                        <a:lnSpc>
-                          <a:spcPct val="100000"/>
-                        </a:lnSpc>
-                        <a:spcBef>
-                          <a:spcPts val="0"/>
-                        </a:spcBef>
-                        <a:spcAft>
-                          <a:spcPts val="0"/>
-                        </a:spcAft>
-                        <a:buClrTx/>
-                        <a:buSzTx/>
-                        <a:buFontTx/>
-                        <a:buNone/>
-                        <a:tabLst/>
-                        <a:defRPr/>
-                      </a:pPr>
-                      <a:r>
-                        <a:rPr lang="en-BD" sz="2000"/>
-                        <a:t>Canditate 3</a:t>
-                      </a:r>
-                    </a:p>
-                  </a:txBody>
-                  <a:tcPr marL="101090" marR="101090" marT="50545" marB="50545"/>
-                </a:tc>
-                <a:extLst>
-                  <a:ext uri="{0D108BD9-81ED-4DB2-BD59-A6C34878D82A}">
-                    <a16:rowId xmlns:a16="http://schemas.microsoft.com/office/drawing/2014/main" val="527192938"/>
-                  </a:ext>
-                </a:extLst>
-              </a:tr>
-              <a:tr h="444797">
-                <a:tc>
-                  <a:txBody>
-                    <a:bodyPr/>
-                    <a:lstStyle/>
-                    <a:p>
-                      <a:r>
-                        <a:rPr lang="en-BD" sz="2000"/>
-                        <a:t>Understanding</a:t>
-                      </a:r>
-                    </a:p>
-                  </a:txBody>
-                  <a:tcPr marL="101090" marR="101090" marT="50545" marB="50545"/>
-                </a:tc>
-                <a:tc>
-                  <a:txBody>
-                    <a:bodyPr/>
-                    <a:lstStyle/>
-                    <a:p>
-                      <a:r>
-                        <a:rPr lang="en-BD" sz="2000"/>
-                        <a:t>Yes</a:t>
-                      </a:r>
-                    </a:p>
-                  </a:txBody>
-                  <a:tcPr marL="101090" marR="101090" marT="50545" marB="50545"/>
-                </a:tc>
-                <a:tc>
-                  <a:txBody>
-                    <a:bodyPr/>
-                    <a:lstStyle/>
-                    <a:p>
-                      <a:r>
-                        <a:rPr lang="en-BD" sz="2000" dirty="0"/>
-                        <a:t>Partly</a:t>
-                      </a:r>
-                    </a:p>
-                  </a:txBody>
-                  <a:tcPr marL="101090" marR="101090" marT="50545" marB="50545"/>
-                </a:tc>
-                <a:tc>
-                  <a:txBody>
-                    <a:bodyPr/>
-                    <a:lstStyle/>
-                    <a:p>
-                      <a:r>
-                        <a:rPr lang="en-BD" sz="2000" dirty="0"/>
-                        <a:t>Yes</a:t>
-                      </a:r>
-                    </a:p>
-                  </a:txBody>
-                  <a:tcPr marL="101090" marR="101090" marT="50545" marB="50545"/>
-                </a:tc>
-                <a:extLst>
-                  <a:ext uri="{0D108BD9-81ED-4DB2-BD59-A6C34878D82A}">
-                    <a16:rowId xmlns:a16="http://schemas.microsoft.com/office/drawing/2014/main" val="1649843950"/>
-                  </a:ext>
-                </a:extLst>
-              </a:tr>
-              <a:tr h="444797">
-                <a:tc>
-                  <a:txBody>
-                    <a:bodyPr/>
-                    <a:lstStyle/>
-                    <a:p>
-                      <a:r>
-                        <a:rPr lang="en-BD" sz="2000"/>
-                        <a:t>Support Needed</a:t>
-                      </a:r>
-                    </a:p>
-                  </a:txBody>
-                  <a:tcPr marL="101090" marR="101090" marT="50545" marB="50545"/>
-                </a:tc>
-                <a:tc>
-                  <a:txBody>
-                    <a:bodyPr/>
-                    <a:lstStyle/>
-                    <a:p>
-                      <a:r>
-                        <a:rPr lang="en-BD" sz="2000"/>
-                        <a:t>No</a:t>
-                      </a:r>
-                      <a:endParaRPr lang="en-BD" sz="2000" dirty="0"/>
-                    </a:p>
-                  </a:txBody>
-                  <a:tcPr marL="101090" marR="101090" marT="50545" marB="50545"/>
-                </a:tc>
-                <a:tc>
-                  <a:txBody>
-                    <a:bodyPr/>
-                    <a:lstStyle/>
-                    <a:p>
-                      <a:r>
-                        <a:rPr lang="en-BD" sz="2000" dirty="0"/>
-                        <a:t>Yes</a:t>
-                      </a:r>
-                    </a:p>
-                  </a:txBody>
-                  <a:tcPr marL="101090" marR="101090" marT="50545" marB="50545"/>
-                </a:tc>
-                <a:tc>
-                  <a:txBody>
-                    <a:bodyPr/>
-                    <a:lstStyle/>
-                    <a:p>
-                      <a:r>
-                        <a:rPr lang="en-BD" sz="2000" dirty="0"/>
-                        <a:t>No</a:t>
-                      </a:r>
-                    </a:p>
-                  </a:txBody>
-                  <a:tcPr marL="101090" marR="101090" marT="50545" marB="50545"/>
-                </a:tc>
-                <a:extLst>
-                  <a:ext uri="{0D108BD9-81ED-4DB2-BD59-A6C34878D82A}">
-                    <a16:rowId xmlns:a16="http://schemas.microsoft.com/office/drawing/2014/main" val="967924198"/>
-                  </a:ext>
-                </a:extLst>
-              </a:tr>
-              <a:tr h="444797">
-                <a:tc>
-                  <a:txBody>
-                    <a:bodyPr/>
-                    <a:lstStyle/>
-                    <a:p>
-                      <a:r>
-                        <a:rPr lang="en-BD" sz="2000"/>
-                        <a:t>Correct Answer</a:t>
-                      </a:r>
-                    </a:p>
-                  </a:txBody>
-                  <a:tcPr marL="101090" marR="101090" marT="50545" marB="50545"/>
-                </a:tc>
-                <a:tc>
-                  <a:txBody>
-                    <a:bodyPr/>
-                    <a:lstStyle/>
-                    <a:p>
-                      <a:r>
-                        <a:rPr lang="en-BD" sz="2000"/>
-                        <a:t>Yes</a:t>
-                      </a:r>
-                    </a:p>
-                  </a:txBody>
-                  <a:tcPr marL="101090" marR="101090" marT="50545" marB="50545"/>
-                </a:tc>
-                <a:tc>
-                  <a:txBody>
-                    <a:bodyPr/>
-                    <a:lstStyle/>
-                    <a:p>
-                      <a:r>
-                        <a:rPr lang="en-BD" sz="2000" dirty="0"/>
-                        <a:t>Yes</a:t>
-                      </a:r>
-                    </a:p>
-                  </a:txBody>
-                  <a:tcPr marL="101090" marR="101090" marT="50545" marB="50545"/>
-                </a:tc>
-                <a:tc>
-                  <a:txBody>
-                    <a:bodyPr/>
-                    <a:lstStyle/>
-                    <a:p>
-                      <a:r>
-                        <a:rPr lang="en-BD" sz="2000" dirty="0"/>
-                        <a:t>Yes</a:t>
-                      </a:r>
-                    </a:p>
-                  </a:txBody>
-                  <a:tcPr marL="101090" marR="101090" marT="50545" marB="50545"/>
-                </a:tc>
-                <a:extLst>
-                  <a:ext uri="{0D108BD9-81ED-4DB2-BD59-A6C34878D82A}">
-                    <a16:rowId xmlns:a16="http://schemas.microsoft.com/office/drawing/2014/main" val="1442486957"/>
-                  </a:ext>
-                </a:extLst>
-              </a:tr>
-              <a:tr h="1657879">
-                <a:tc>
-                  <a:txBody>
-                    <a:bodyPr/>
-                    <a:lstStyle/>
-                    <a:p>
-                      <a:r>
-                        <a:rPr lang="en-BD" sz="2000" dirty="0"/>
-                        <a:t>Feedback</a:t>
-                      </a:r>
-                    </a:p>
-                  </a:txBody>
-                  <a:tcPr marL="101090" marR="101090" marT="50545" marB="50545"/>
-                </a:tc>
-                <a:tc>
-                  <a:txBody>
-                    <a:bodyPr/>
-                    <a:lstStyle/>
-                    <a:p>
-                      <a:r>
-                        <a:rPr lang="en-GB" sz="2000" dirty="0"/>
-                        <a:t>Started adding the BAN for different continents but did not immediately notice the 'total' BAN.</a:t>
-                      </a:r>
-                      <a:endParaRPr lang="en-BD" sz="2000" dirty="0"/>
-                    </a:p>
-                  </a:txBody>
-                  <a:tcPr marL="101090" marR="101090" marT="50545" marB="50545"/>
-                </a:tc>
-                <a:tc>
-                  <a:txBody>
-                    <a:bodyPr/>
-                    <a:lstStyle/>
-                    <a:p>
-                      <a:r>
-                        <a:rPr lang="en-GB" sz="2000" dirty="0"/>
-                        <a:t>The answer can be given by using the 'status' filter or the </a:t>
-                      </a:r>
-                      <a:r>
-                        <a:rPr lang="en-GB" sz="2000" dirty="0" err="1"/>
-                        <a:t>timeslider</a:t>
-                      </a:r>
-                      <a:r>
-                        <a:rPr lang="en-GB" sz="2000" dirty="0"/>
-                        <a:t>; both give slightly different answers.</a:t>
-                      </a:r>
-                      <a:endParaRPr lang="en-BD" sz="2000" dirty="0"/>
-                    </a:p>
-                  </a:txBody>
-                  <a:tcPr marL="101090" marR="101090" marT="50545" marB="50545"/>
-                </a:tc>
-                <a:tc>
-                  <a:txBody>
-                    <a:bodyPr/>
-                    <a:lstStyle/>
-                    <a:p>
-                      <a:r>
-                        <a:rPr lang="en-GB" sz="2000" dirty="0"/>
-                        <a:t>Only issue was uncertainty about 'currently'; unclear that only 'operating' should be selected.</a:t>
-                      </a:r>
-                      <a:endParaRPr lang="en-BD" sz="2000" dirty="0"/>
-                    </a:p>
-                  </a:txBody>
-                  <a:tcPr marL="101090" marR="101090" marT="50545" marB="50545"/>
-                </a:tc>
-                <a:extLst>
-                  <a:ext uri="{0D108BD9-81ED-4DB2-BD59-A6C34878D82A}">
-                    <a16:rowId xmlns:a16="http://schemas.microsoft.com/office/drawing/2014/main" val="2529668582"/>
-                  </a:ext>
-                </a:extLst>
-              </a:tr>
-            </a:tbl>
-          </a:graphicData>
-        </a:graphic>
-      </p:graphicFrame>
-      <p:sp>
-        <p:nvSpPr>
-          <p:cNvPr id="9" name="Rounded Rectangle 8"/>
-          <p:cNvSpPr/>
-          <p:nvPr/>
-        </p:nvSpPr>
-        <p:spPr>
-          <a:xfrm>
-            <a:off x="1192306" y="2967318"/>
-            <a:ext cx="2770094" cy="1685364"/>
-          </a:xfrm>
-          <a:prstGeom prst="roundRect">
-            <a:avLst/>
-          </a:prstGeom>
-          <a:solidFill>
-            <a:schemeClr val="accent4"/>
-          </a:solidFill>
-          <a:ln>
-            <a:noFill/>
-          </a:ln>
-        </p:spPr>
-        <p:style>
-          <a:lnRef idx="0">
-            <a:scrgbClr r="0" g="0" b="0"/>
-          </a:lnRef>
-          <a:fillRef idx="0">
-            <a:scrgbClr r="0" g="0" b="0"/>
-          </a:fillRef>
-          <a:effectRef idx="0">
-            <a:scrgbClr r="0" g="0" b="0"/>
-          </a:effectRef>
-          <a:fontRef idx="minor">
-            <a:schemeClr val="lt1"/>
-          </a:fontRef>
-        </p:style>
-        <p:txBody>
-          <a:bodyPr rtlCol="0" anchor="ctr"/>
-          <a:lstStyle/>
-          <a:p>
-            <a:pPr algn="ctr"/>
-            <a:r>
-              <a:rPr lang="en-BE" dirty="0" smtClean="0"/>
-              <a:t>remove</a:t>
-            </a:r>
-            <a:endParaRPr lang="nl-BE" dirty="0"/>
-          </a:p>
-        </p:txBody>
-      </p:sp>
+      </p:pic>
     </p:spTree>
     <p:extLst>
       <p:ext uri="{BB962C8B-B14F-4D97-AF65-F5344CB8AC3E}">
-        <p14:creationId xmlns:p14="http://schemas.microsoft.com/office/powerpoint/2010/main" val="3137785869"/>
+        <p14:creationId xmlns:p14="http://schemas.microsoft.com/office/powerpoint/2010/main" val="83100769"/>
       </p:ext>
     </p:extLst>
   </p:cSld>
   <p:clrMapOvr>
     <a:masterClrMapping/>
   </p:clrMapOvr>
-  <mc:AlternateContent xmlns:mc="http://schemas.openxmlformats.org/markup-compatibility/2006" xmlns:p14="http://schemas.microsoft.com/office/powerpoint/2010/main">
-    <mc:Choice Requires="p14">
-      <p:transition spd="slow" p14:dur="2000"/>
-    </mc:Choice>
-    <mc:Fallback xmlns="">
-      <p:transition spd="slow"/>
-    </mc:Fallback>
-  </mc:AlternateContent>
+</p:sld>
+</file>
+
+<file path=ppt/slides/slide9.xml><?xml version="1.0" encoding="utf-8"?>
+<p:sld xmlns:a="http://schemas.openxmlformats.org/drawingml/2006/main" xmlns:r="http://schemas.openxmlformats.org/officeDocument/2006/relationships" xmlns:p="http://schemas.openxmlformats.org/presentationml/2006/main">
+  <p:cSld>
+    <p:spTree>
+      <p:nvGrpSpPr>
+        <p:cNvPr id="1" name=""/>
+        <p:cNvGrpSpPr/>
+        <p:nvPr/>
+      </p:nvGrpSpPr>
+      <p:grpSpPr>
+        <a:xfrm>
+          <a:off x="0" y="0"/>
+          <a:ext cx="0" cy="0"/>
+          <a:chOff x="0" y="0"/>
+          <a:chExt cx="0" cy="0"/>
+        </a:xfrm>
+      </p:grpSpPr>
+      <p:sp>
+        <p:nvSpPr>
+          <p:cNvPr id="4" name="Title 3"/>
+          <p:cNvSpPr>
+            <a:spLocks noGrp="1"/>
+          </p:cNvSpPr>
+          <p:nvPr>
+            <p:ph type="ctrTitle"/>
+          </p:nvPr>
+        </p:nvSpPr>
+        <p:spPr/>
+        <p:txBody>
+          <a:bodyPr/>
+          <a:lstStyle/>
+          <a:p>
+            <a:r>
+              <a:rPr lang="en-BE" dirty="0"/>
+              <a:t>Time for questions!</a:t>
+            </a:r>
+            <a:endParaRPr lang="nl-BE" dirty="0"/>
+          </a:p>
+        </p:txBody>
+      </p:sp>
+    </p:spTree>
+    <p:extLst>
+      <p:ext uri="{BB962C8B-B14F-4D97-AF65-F5344CB8AC3E}">
+        <p14:creationId xmlns:p14="http://schemas.microsoft.com/office/powerpoint/2010/main" val="193048007"/>
+      </p:ext>
+    </p:extLst>
+  </p:cSld>
+  <p:clrMapOvr>
+    <a:masterClrMapping/>
+  </p:clrMapOvr>
 </p:sld>
 </file>
 

</xml_diff>